<commit_message>
pr├®sentation - fichiers .bat
</commit_message>
<xml_diff>
--- a/doc/présentation V5.pptx
+++ b/doc/présentation V5.pptx
@@ -5,7 +5,7 @@
     <p:sldMasterId id="2147483711" r:id="rId1"/>
   </p:sldMasterIdLst>
   <p:notesMasterIdLst>
-    <p:notesMasterId r:id="rId29"/>
+    <p:notesMasterId r:id="rId30"/>
   </p:notesMasterIdLst>
   <p:sldIdLst>
     <p:sldId id="256" r:id="rId2"/>
@@ -31,10 +31,11 @@
     <p:sldId id="276" r:id="rId22"/>
     <p:sldId id="287" r:id="rId23"/>
     <p:sldId id="270" r:id="rId24"/>
-    <p:sldId id="257" r:id="rId25"/>
-    <p:sldId id="283" r:id="rId26"/>
+    <p:sldId id="283" r:id="rId25"/>
+    <p:sldId id="299" r:id="rId26"/>
     <p:sldId id="294" r:id="rId27"/>
     <p:sldId id="296" r:id="rId28"/>
+    <p:sldId id="257" r:id="rId29"/>
   </p:sldIdLst>
   <p:sldSz cx="12192000" cy="6858000"/>
   <p:notesSz cx="7315200" cy="9601200"/>
@@ -229,7 +230,7 @@
           <a:p>
             <a:fld id="{3A579BB9-F2CA-426C-82A6-1234A0AE4AD5}" type="datetimeFigureOut">
               <a:rPr lang="fr-FR" smtClean="0"/>
-              <a:t>30/01/2023</a:t>
+              <a:t>01/02/2023</a:t>
             </a:fld>
             <a:endParaRPr lang="fr-FR"/>
           </a:p>
@@ -8245,23 +8246,23 @@
             </a:endParaRPr>
           </a:p>
           <a:p>
-            <a:pPr marL="0" marR="0" lvl="0" indent="0" algn="l" defTabSz="914400" rtl="0" eaLnBrk="1" fontAlgn="auto" latinLnBrk="0" hangingPunct="1">
-              <a:lnSpc>
-                <a:spcPct val="107000"/>
-              </a:lnSpc>
-              <a:spcBef>
-                <a:spcPts val="0"/>
-              </a:spcBef>
+            <a:pPr>
+              <a:lnSpc>
+                <a:spcPct val="107000"/>
+              </a:lnSpc>
               <a:spcAft>
                 <a:spcPts val="800"/>
               </a:spcAft>
-              <a:buClrTx/>
-              <a:buSzTx/>
-              <a:buFontTx/>
-              <a:buNone/>
-              <a:tabLst/>
-              <a:defRPr/>
-            </a:pPr>
+            </a:pPr>
+            <a:r>
+              <a:rPr lang="fr-FR" sz="1800" dirty="0">
+                <a:effectLst/>
+                <a:latin typeface="Calibri" panose="020F0502020204030204" pitchFamily="34" charset="0"/>
+                <a:ea typeface="Calibri" panose="020F0502020204030204" pitchFamily="34" charset="0"/>
+                <a:cs typeface="Times New Roman" panose="02020603050405020304" pitchFamily="18" charset="0"/>
+              </a:rPr>
+              <a:t>C’est un </a:t>
+            </a:r>
             <a:r>
               <a:rPr lang="fr-FR" sz="1800" dirty="0" err="1">
                 <a:effectLst/>
@@ -8269,43 +8270,16 @@
                 <a:ea typeface="Calibri" panose="020F0502020204030204" pitchFamily="34" charset="0"/>
                 <a:cs typeface="Times New Roman" panose="02020603050405020304" pitchFamily="18" charset="0"/>
               </a:rPr>
-              <a:t>Sequelize</a:t>
-            </a:r>
-            <a:r>
-              <a:rPr lang="fr-FR" sz="1800" dirty="0">
-                <a:effectLst/>
-                <a:latin typeface="Calibri" panose="020F0502020204030204" pitchFamily="34" charset="0"/>
-                <a:ea typeface="Calibri" panose="020F0502020204030204" pitchFamily="34" charset="0"/>
-                <a:cs typeface="Times New Roman" panose="02020603050405020304" pitchFamily="18" charset="0"/>
-              </a:rPr>
-              <a:t> qui est un </a:t>
-            </a:r>
-            <a:r>
-              <a:rPr lang="fr-FR" sz="1800" dirty="0" err="1">
-                <a:effectLst/>
-                <a:latin typeface="Calibri" panose="020F0502020204030204" pitchFamily="34" charset="0"/>
-                <a:ea typeface="Calibri" panose="020F0502020204030204" pitchFamily="34" charset="0"/>
-                <a:cs typeface="Times New Roman" panose="02020603050405020304" pitchFamily="18" charset="0"/>
-              </a:rPr>
               <a:t>framework</a:t>
             </a:r>
             <a:r>
-              <a:rPr lang="fr-FR" sz="1800">
-                <a:effectLst/>
-                <a:latin typeface="Calibri" panose="020F0502020204030204" pitchFamily="34" charset="0"/>
-                <a:ea typeface="Calibri" panose="020F0502020204030204" pitchFamily="34" charset="0"/>
-                <a:cs typeface="Times New Roman" panose="02020603050405020304" pitchFamily="18" charset="0"/>
-              </a:rPr>
-              <a:t> possède </a:t>
-            </a:r>
-            <a:r>
-              <a:rPr lang="fr-FR" sz="1800" dirty="0">
-                <a:effectLst/>
-                <a:latin typeface="Calibri" panose="020F0502020204030204" pitchFamily="34" charset="0"/>
-                <a:ea typeface="Calibri" panose="020F0502020204030204" pitchFamily="34" charset="0"/>
-                <a:cs typeface="Times New Roman" panose="02020603050405020304" pitchFamily="18" charset="0"/>
-              </a:rPr>
-              <a:t>ces propres fonctions pour récupérer les données de la base, les convertir en objet et vice versa.</a:t>
+              <a:rPr lang="fr-FR" sz="1800" dirty="0">
+                <a:effectLst/>
+                <a:latin typeface="Calibri" panose="020F0502020204030204" pitchFamily="34" charset="0"/>
+                <a:ea typeface="Calibri" panose="020F0502020204030204" pitchFamily="34" charset="0"/>
+                <a:cs typeface="Times New Roman" panose="02020603050405020304" pitchFamily="18" charset="0"/>
+              </a:rPr>
+              <a:t> qui possède ces propres fonctions pour récupérer les données de la base, les convertir en objet et vice versa.</a:t>
             </a:r>
           </a:p>
           <a:p>
@@ -8324,7 +8298,7 @@
                 <a:ea typeface="Calibri" panose="020F0502020204030204" pitchFamily="34" charset="0"/>
                 <a:cs typeface="Times New Roman" panose="02020603050405020304" pitchFamily="18" charset="0"/>
               </a:rPr>
-              <a:t>Il évite au maximum les requêtes SQL. Et, quand ces requêtes sont inévitables, il empêche les problèmes d’injections SQL.</a:t>
+              <a:t>Là encore, j’ai logé ces fonctions par catégories dans les fichiers distincts, appelés DAO.</a:t>
             </a:r>
           </a:p>
           <a:p>
@@ -8343,43 +8317,7 @@
                 <a:ea typeface="Calibri" panose="020F0502020204030204" pitchFamily="34" charset="0"/>
                 <a:cs typeface="Times New Roman" panose="02020603050405020304" pitchFamily="18" charset="0"/>
               </a:rPr>
-              <a:t>J’ai mis ces fonctions dans des fichiers DAO (</a:t>
-            </a:r>
-            <a:r>
-              <a:rPr lang="fr-FR" sz="1800" u="sng" dirty="0">
-                <a:effectLst/>
-                <a:latin typeface="Calibri" panose="020F0502020204030204" pitchFamily="34" charset="0"/>
-                <a:ea typeface="Calibri" panose="020F0502020204030204" pitchFamily="34" charset="0"/>
-                <a:cs typeface="Times New Roman" panose="02020603050405020304" pitchFamily="18" charset="0"/>
-              </a:rPr>
-              <a:t>Data Access Object</a:t>
-            </a:r>
-            <a:r>
-              <a:rPr lang="fr-FR" sz="1800" dirty="0">
-                <a:effectLst/>
-                <a:latin typeface="Calibri" panose="020F0502020204030204" pitchFamily="34" charset="0"/>
-                <a:ea typeface="Calibri" panose="020F0502020204030204" pitchFamily="34" charset="0"/>
-                <a:cs typeface="Times New Roman" panose="02020603050405020304" pitchFamily="18" charset="0"/>
-              </a:rPr>
-              <a:t>) distincts des </a:t>
-            </a:r>
-            <a:r>
-              <a:rPr lang="fr-FR" sz="1800" dirty="0" err="1">
-                <a:effectLst/>
-                <a:latin typeface="Calibri" panose="020F0502020204030204" pitchFamily="34" charset="0"/>
-                <a:ea typeface="Calibri" panose="020F0502020204030204" pitchFamily="34" charset="0"/>
-                <a:cs typeface="Times New Roman" panose="02020603050405020304" pitchFamily="18" charset="0"/>
-              </a:rPr>
-              <a:t>Models</a:t>
-            </a:r>
-            <a:r>
-              <a:rPr lang="fr-FR" sz="1800" dirty="0">
-                <a:effectLst/>
-                <a:latin typeface="Calibri" panose="020F0502020204030204" pitchFamily="34" charset="0"/>
-                <a:ea typeface="Calibri" panose="020F0502020204030204" pitchFamily="34" charset="0"/>
-                <a:cs typeface="Times New Roman" panose="02020603050405020304" pitchFamily="18" charset="0"/>
-              </a:rPr>
-              <a:t>, pour clarifier le code.</a:t>
+              <a:t>Les DAO évitent un maximum les requêtes SQL. Certaines permettent tout de même la saisie de requêtes. Elles empêchent alors les problèmes d’injections SQL.</a:t>
             </a:r>
           </a:p>
           <a:p>
@@ -8391,15 +8329,12 @@
                 <a:spcPts val="800"/>
               </a:spcAft>
             </a:pPr>
-            <a:r>
-              <a:rPr lang="fr-FR" sz="1800" dirty="0">
-                <a:effectLst/>
-                <a:latin typeface="Calibri" panose="020F0502020204030204" pitchFamily="34" charset="0"/>
-                <a:ea typeface="Calibri" panose="020F0502020204030204" pitchFamily="34" charset="0"/>
-                <a:cs typeface="Times New Roman" panose="02020603050405020304" pitchFamily="18" charset="0"/>
-              </a:rPr>
-              <a:t> </a:t>
-            </a:r>
+            <a:endParaRPr lang="fr-FR" sz="1800" dirty="0">
+              <a:effectLst/>
+              <a:latin typeface="Calibri" panose="020F0502020204030204" pitchFamily="34" charset="0"/>
+              <a:ea typeface="Calibri" panose="020F0502020204030204" pitchFamily="34" charset="0"/>
+              <a:cs typeface="Times New Roman" panose="02020603050405020304" pitchFamily="18" charset="0"/>
+            </a:endParaRPr>
           </a:p>
           <a:p>
             <a:pPr>
@@ -8417,25 +8352,7 @@
                 <a:ea typeface="Calibri" panose="020F0502020204030204" pitchFamily="34" charset="0"/>
                 <a:cs typeface="Times New Roman" panose="02020603050405020304" pitchFamily="18" charset="0"/>
               </a:rPr>
-              <a:t>Couches = rôle dans l’organisation =&gt; </a:t>
-            </a:r>
-            <a:r>
-              <a:rPr lang="fr-FR" sz="1800" dirty="0" err="1">
-                <a:effectLst/>
-                <a:latin typeface="Calibri" panose="020F0502020204030204" pitchFamily="34" charset="0"/>
-                <a:ea typeface="Calibri" panose="020F0502020204030204" pitchFamily="34" charset="0"/>
-                <a:cs typeface="Times New Roman" panose="02020603050405020304" pitchFamily="18" charset="0"/>
-              </a:rPr>
-              <a:t>controller</a:t>
-            </a:r>
-            <a:r>
-              <a:rPr lang="fr-FR" sz="1800" dirty="0">
-                <a:effectLst/>
-                <a:latin typeface="Calibri" panose="020F0502020204030204" pitchFamily="34" charset="0"/>
-                <a:ea typeface="Calibri" panose="020F0502020204030204" pitchFamily="34" charset="0"/>
-                <a:cs typeface="Times New Roman" panose="02020603050405020304" pitchFamily="18" charset="0"/>
-              </a:rPr>
-              <a:t> reçoit les demandes, qu’il transmet aux services, qui utilisent les fonctions d’ORM, qui utilisent les objets, qui représentent les tables de la bd.</a:t>
+              <a:t> </a:t>
             </a:r>
           </a:p>
           <a:p>
@@ -8454,7 +8371,63 @@
                 <a:ea typeface="Calibri" panose="020F0502020204030204" pitchFamily="34" charset="0"/>
                 <a:cs typeface="Times New Roman" panose="02020603050405020304" pitchFamily="18" charset="0"/>
               </a:rPr>
+              <a:t>Couches = rôle dans l’organisation =&gt; </a:t>
+            </a:r>
+            <a:r>
+              <a:rPr lang="fr-FR" sz="1800" dirty="0" err="1">
+                <a:effectLst/>
+                <a:latin typeface="Calibri" panose="020F0502020204030204" pitchFamily="34" charset="0"/>
+                <a:ea typeface="Calibri" panose="020F0502020204030204" pitchFamily="34" charset="0"/>
+                <a:cs typeface="Times New Roman" panose="02020603050405020304" pitchFamily="18" charset="0"/>
+              </a:rPr>
+              <a:t>controller</a:t>
+            </a:r>
+            <a:r>
+              <a:rPr lang="fr-FR" sz="1800" dirty="0">
+                <a:effectLst/>
+                <a:latin typeface="Calibri" panose="020F0502020204030204" pitchFamily="34" charset="0"/>
+                <a:ea typeface="Calibri" panose="020F0502020204030204" pitchFamily="34" charset="0"/>
+                <a:cs typeface="Times New Roman" panose="02020603050405020304" pitchFamily="18" charset="0"/>
+              </a:rPr>
+              <a:t> reçoit les demandes, qu’il transmet aux services, qui utilisent les fonctions DAO, qui utilisent les objets, qui représentent les tables de la bd.</a:t>
+            </a:r>
+          </a:p>
+          <a:p>
+            <a:pPr>
+              <a:lnSpc>
+                <a:spcPct val="107000"/>
+              </a:lnSpc>
+              <a:spcAft>
+                <a:spcPts val="800"/>
+              </a:spcAft>
+            </a:pPr>
+            <a:r>
+              <a:rPr lang="fr-FR" sz="1800" dirty="0">
+                <a:effectLst/>
+                <a:latin typeface="Calibri" panose="020F0502020204030204" pitchFamily="34" charset="0"/>
+                <a:ea typeface="Calibri" panose="020F0502020204030204" pitchFamily="34" charset="0"/>
+                <a:cs typeface="Times New Roman" panose="02020603050405020304" pitchFamily="18" charset="0"/>
+              </a:rPr>
               <a:t> </a:t>
+            </a:r>
+          </a:p>
+          <a:p>
+            <a:pPr>
+              <a:lnSpc>
+                <a:spcPct val="107000"/>
+              </a:lnSpc>
+              <a:spcAft>
+                <a:spcPts val="800"/>
+              </a:spcAft>
+            </a:pPr>
+            <a:r>
+              <a:rPr lang="fr-FR" sz="1800" b="1" dirty="0">
+                <a:effectLst/>
+                <a:latin typeface="Calibri" panose="020F0502020204030204" pitchFamily="34" charset="0"/>
+                <a:ea typeface="Calibri" panose="020F0502020204030204" pitchFamily="34" charset="0"/>
+                <a:cs typeface="Times New Roman" panose="02020603050405020304" pitchFamily="18" charset="0"/>
+              </a:rPr>
+              <a:t>Pour en finir avec la technique.</a:t>
             </a:r>
           </a:p>
           <a:p>
@@ -8551,22 +8524,13 @@
               </a:spcAft>
             </a:pPr>
             <a:r>
-              <a:rPr lang="fr-FR" sz="1800" b="1" dirty="0">
-                <a:effectLst/>
-                <a:latin typeface="Calibri" panose="020F0502020204030204" pitchFamily="34" charset="0"/>
-                <a:ea typeface="Calibri" panose="020F0502020204030204" pitchFamily="34" charset="0"/>
-                <a:cs typeface="Times New Roman" panose="02020603050405020304" pitchFamily="18" charset="0"/>
-              </a:rPr>
-              <a:t>Pour en finir avec la technique</a:t>
-            </a:r>
-            <a:r>
-              <a:rPr lang="fr-FR" sz="1800" dirty="0">
-                <a:effectLst/>
-                <a:latin typeface="Calibri" panose="020F0502020204030204" pitchFamily="34" charset="0"/>
-                <a:ea typeface="Calibri" panose="020F0502020204030204" pitchFamily="34" charset="0"/>
-                <a:cs typeface="Times New Roman" panose="02020603050405020304" pitchFamily="18" charset="0"/>
-              </a:rPr>
-              <a:t>, j’ai réparti toutes les données nécessaires pour ce projet en 9 catégories.</a:t>
+              <a:rPr lang="fr-FR" sz="1800" dirty="0">
+                <a:effectLst/>
+                <a:latin typeface="Calibri" panose="020F0502020204030204" pitchFamily="34" charset="0"/>
+                <a:ea typeface="Calibri" panose="020F0502020204030204" pitchFamily="34" charset="0"/>
+                <a:cs typeface="Times New Roman" panose="02020603050405020304" pitchFamily="18" charset="0"/>
+              </a:rPr>
+              <a:t>J’ai réparti toutes les données nécessaires pour ce projet en 9 tables.</a:t>
             </a:r>
           </a:p>
           <a:p>
@@ -8585,26 +8549,7 @@
                 <a:ea typeface="Calibri" panose="020F0502020204030204" pitchFamily="34" charset="0"/>
                 <a:cs typeface="Times New Roman" panose="02020603050405020304" pitchFamily="18" charset="0"/>
               </a:rPr>
-              <a:t>Le résultat est une base de données de 9 tables.</a:t>
-            </a:r>
-          </a:p>
-          <a:p>
-            <a:pPr>
-              <a:lnSpc>
-                <a:spcPct val="107000"/>
-              </a:lnSpc>
-              <a:spcAft>
-                <a:spcPts val="800"/>
-              </a:spcAft>
-            </a:pPr>
-            <a:r>
-              <a:rPr lang="fr-FR" sz="1800" dirty="0">
-                <a:effectLst/>
-                <a:latin typeface="Calibri" panose="020F0502020204030204" pitchFamily="34" charset="0"/>
-                <a:ea typeface="Calibri" panose="020F0502020204030204" pitchFamily="34" charset="0"/>
-                <a:cs typeface="Times New Roman" panose="02020603050405020304" pitchFamily="18" charset="0"/>
-              </a:rPr>
-              <a:t>Chaque table a sa clé primaire.</a:t>
+              <a:t>Chaque table avec sa clé primaire.</a:t>
             </a:r>
           </a:p>
           <a:p>
@@ -8803,7 +8748,7 @@
               </a:spcAft>
             </a:pPr>
             <a:r>
-              <a:rPr lang="fr-FR" sz="1800" dirty="0">
+              <a:rPr lang="fr-FR" sz="1800" b="1" dirty="0">
                 <a:effectLst/>
                 <a:latin typeface="Calibri" panose="020F0502020204030204" pitchFamily="34" charset="0"/>
                 <a:ea typeface="Calibri" panose="020F0502020204030204" pitchFamily="34" charset="0"/>
@@ -9596,7 +9541,7 @@
             <a:fld id="{AA70F276-1833-4A75-9C1D-A56E2295A68D}" type="datetimeFigureOut">
               <a:rPr lang="en-US" smtClean="0"/>
               <a:pPr/>
-              <a:t>1/30/2023</a:t>
+              <a:t>2/1/2023</a:t>
             </a:fld>
             <a:endParaRPr lang="en-US" dirty="0"/>
           </a:p>
@@ -9800,7 +9745,7 @@
             <a:fld id="{AA70F276-1833-4A75-9C1D-A56E2295A68D}" type="datetimeFigureOut">
               <a:rPr lang="en-US" smtClean="0"/>
               <a:pPr/>
-              <a:t>1/30/2023</a:t>
+              <a:t>2/1/2023</a:t>
             </a:fld>
             <a:endParaRPr lang="en-US" dirty="0"/>
           </a:p>
@@ -10014,7 +9959,7 @@
             <a:fld id="{AA70F276-1833-4A75-9C1D-A56E2295A68D}" type="datetimeFigureOut">
               <a:rPr lang="en-US" smtClean="0"/>
               <a:pPr/>
-              <a:t>1/30/2023</a:t>
+              <a:t>2/1/2023</a:t>
             </a:fld>
             <a:endParaRPr lang="en-US" dirty="0"/>
           </a:p>
@@ -10218,7 +10163,7 @@
             <a:fld id="{AA70F276-1833-4A75-9C1D-A56E2295A68D}" type="datetimeFigureOut">
               <a:rPr lang="en-US" smtClean="0"/>
               <a:pPr/>
-              <a:t>1/30/2023</a:t>
+              <a:t>2/1/2023</a:t>
             </a:fld>
             <a:endParaRPr lang="en-US" dirty="0"/>
           </a:p>
@@ -10499,7 +10444,7 @@
             <a:fld id="{AA70F276-1833-4A75-9C1D-A56E2295A68D}" type="datetimeFigureOut">
               <a:rPr lang="en-US" smtClean="0"/>
               <a:pPr/>
-              <a:t>1/30/2023</a:t>
+              <a:t>2/1/2023</a:t>
             </a:fld>
             <a:endParaRPr lang="en-US" dirty="0"/>
           </a:p>
@@ -10770,7 +10715,7 @@
             <a:fld id="{AA70F276-1833-4A75-9C1D-A56E2295A68D}" type="datetimeFigureOut">
               <a:rPr lang="en-US" smtClean="0"/>
               <a:pPr/>
-              <a:t>1/30/2023</a:t>
+              <a:t>2/1/2023</a:t>
             </a:fld>
             <a:endParaRPr lang="en-US" dirty="0"/>
           </a:p>
@@ -11188,7 +11133,7 @@
             <a:fld id="{AA70F276-1833-4A75-9C1D-A56E2295A68D}" type="datetimeFigureOut">
               <a:rPr lang="en-US" smtClean="0"/>
               <a:pPr/>
-              <a:t>1/30/2023</a:t>
+              <a:t>2/1/2023</a:t>
             </a:fld>
             <a:endParaRPr lang="en-US" dirty="0"/>
           </a:p>
@@ -11335,7 +11280,7 @@
             <a:fld id="{AA70F276-1833-4A75-9C1D-A56E2295A68D}" type="datetimeFigureOut">
               <a:rPr lang="en-US" smtClean="0"/>
               <a:pPr/>
-              <a:t>1/30/2023</a:t>
+              <a:t>2/1/2023</a:t>
             </a:fld>
             <a:endParaRPr lang="en-US" dirty="0"/>
           </a:p>
@@ -11454,7 +11399,7 @@
             <a:fld id="{AA70F276-1833-4A75-9C1D-A56E2295A68D}" type="datetimeFigureOut">
               <a:rPr lang="en-US" smtClean="0"/>
               <a:pPr/>
-              <a:t>1/30/2023</a:t>
+              <a:t>2/1/2023</a:t>
             </a:fld>
             <a:endParaRPr lang="en-US" dirty="0"/>
           </a:p>
@@ -11771,7 +11716,7 @@
             <a:fld id="{AA70F276-1833-4A75-9C1D-A56E2295A68D}" type="datetimeFigureOut">
               <a:rPr lang="en-US" smtClean="0"/>
               <a:pPr/>
-              <a:t>1/30/2023</a:t>
+              <a:t>2/1/2023</a:t>
             </a:fld>
             <a:endParaRPr lang="en-US" dirty="0"/>
           </a:p>
@@ -12065,7 +12010,7 @@
             <a:fld id="{AA70F276-1833-4A75-9C1D-A56E2295A68D}" type="datetimeFigureOut">
               <a:rPr lang="en-US" smtClean="0"/>
               <a:pPr/>
-              <a:t>1/30/2023</a:t>
+              <a:t>2/1/2023</a:t>
             </a:fld>
             <a:endParaRPr lang="en-US" dirty="0"/>
           </a:p>
@@ -12312,7 +12257,7 @@
             <a:fld id="{AA70F276-1833-4A75-9C1D-A56E2295A68D}" type="datetimeFigureOut">
               <a:rPr lang="en-US" smtClean="0"/>
               <a:pPr/>
-              <a:t>1/30/2023</a:t>
+              <a:t>2/1/2023</a:t>
             </a:fld>
             <a:endParaRPr lang="en-US" dirty="0"/>
           </a:p>
@@ -19127,329 +19072,243 @@
           <a:chExt cx="0" cy="0"/>
         </a:xfrm>
       </p:grpSpPr>
-      <p:grpSp>
-        <p:nvGrpSpPr>
-          <p:cNvPr id="29" name="Groupe 28">
+      <p:sp>
+        <p:nvSpPr>
+          <p:cNvPr id="3" name="Titre 1">
             <a:extLst>
               <a:ext uri="{FF2B5EF4-FFF2-40B4-BE49-F238E27FC236}">
-                <a16:creationId xmlns:a16="http://schemas.microsoft.com/office/drawing/2014/main" id="{EBDE3D9D-3C7D-DA7F-4183-D7F28460DD04}"/>
+                <a16:creationId xmlns:a16="http://schemas.microsoft.com/office/drawing/2014/main" id="{575CFBE2-659F-6E42-5DDB-EB888CD813F8}"/>
               </a:ext>
             </a:extLst>
           </p:cNvPr>
-          <p:cNvGrpSpPr/>
+          <p:cNvSpPr txBox="1">
+            <a:spLocks/>
+          </p:cNvSpPr>
           <p:nvPr/>
-        </p:nvGrpSpPr>
-        <p:grpSpPr>
+        </p:nvSpPr>
+        <p:spPr>
           <a:xfrm>
-            <a:off x="1022542" y="1867865"/>
-            <a:ext cx="7011400" cy="1561135"/>
-            <a:chOff x="1022542" y="1867865"/>
-            <a:chExt cx="7011400" cy="1561135"/>
+            <a:off x="682852" y="400632"/>
+            <a:ext cx="10515600" cy="783378"/>
           </a:xfrm>
-        </p:grpSpPr>
-        <p:sp>
-          <p:nvSpPr>
-            <p:cNvPr id="23" name="Légende : flèche vers la droite 22">
-              <a:extLst>
-                <a:ext uri="{FF2B5EF4-FFF2-40B4-BE49-F238E27FC236}">
-                  <a16:creationId xmlns:a16="http://schemas.microsoft.com/office/drawing/2014/main" id="{AF268228-B638-0700-F8C7-EFE202DB6A89}"/>
-                </a:ext>
-              </a:extLst>
-            </p:cNvPr>
-            <p:cNvSpPr/>
-            <p:nvPr/>
-          </p:nvSpPr>
-          <p:spPr>
-            <a:xfrm>
-              <a:off x="1022542" y="1867865"/>
-              <a:ext cx="4378798" cy="1062527"/>
-            </a:xfrm>
-            <a:prstGeom prst="rightArrowCallout">
-              <a:avLst/>
-            </a:prstGeom>
-            <a:solidFill>
-              <a:schemeClr val="bg1"/>
-            </a:solidFill>
-          </p:spPr>
-          <p:style>
-            <a:lnRef idx="2">
-              <a:schemeClr val="accent1">
-                <a:shade val="50000"/>
-              </a:schemeClr>
-            </a:lnRef>
-            <a:fillRef idx="1">
-              <a:schemeClr val="accent1"/>
-            </a:fillRef>
-            <a:effectRef idx="0">
-              <a:schemeClr val="accent1"/>
-            </a:effectRef>
-            <a:fontRef idx="minor">
-              <a:schemeClr val="lt1"/>
-            </a:fontRef>
-          </p:style>
-          <p:txBody>
-            <a:bodyPr rtlCol="0" anchor="ctr"/>
-            <a:lstStyle/>
-            <a:p>
-              <a:pPr algn="ctr"/>
-              <a:endParaRPr lang="fr-FR"/>
-            </a:p>
-          </p:txBody>
-        </p:sp>
-        <p:grpSp>
-          <p:nvGrpSpPr>
-            <p:cNvPr id="28" name="Groupe 27">
-              <a:extLst>
-                <a:ext uri="{FF2B5EF4-FFF2-40B4-BE49-F238E27FC236}">
-                  <a16:creationId xmlns:a16="http://schemas.microsoft.com/office/drawing/2014/main" id="{63C295B6-CE98-5219-A742-F63BA38A518D}"/>
-                </a:ext>
-              </a:extLst>
-            </p:cNvPr>
-            <p:cNvGrpSpPr/>
-            <p:nvPr/>
-          </p:nvGrpSpPr>
-          <p:grpSpPr>
-            <a:xfrm>
-              <a:off x="5528648" y="2261002"/>
-              <a:ext cx="2505294" cy="1167998"/>
-              <a:chOff x="5528648" y="2261002"/>
-              <a:chExt cx="2505294" cy="1167998"/>
-            </a:xfrm>
-          </p:grpSpPr>
-          <p:sp>
-            <p:nvSpPr>
-              <p:cNvPr id="4" name="ZoneTexte 3">
-                <a:extLst>
-                  <a:ext uri="{FF2B5EF4-FFF2-40B4-BE49-F238E27FC236}">
-                    <a16:creationId xmlns:a16="http://schemas.microsoft.com/office/drawing/2014/main" id="{ACBFB3C2-24E4-1B23-1AB4-B4C8AD4DA46F}"/>
-                  </a:ext>
-                </a:extLst>
-              </p:cNvPr>
-              <p:cNvSpPr txBox="1"/>
-              <p:nvPr/>
-            </p:nvSpPr>
-            <p:spPr>
-              <a:xfrm>
-                <a:off x="5528648" y="2261002"/>
-                <a:ext cx="2505294" cy="282513"/>
-              </a:xfrm>
-              <a:prstGeom prst="rect">
-                <a:avLst/>
-              </a:prstGeom>
-              <a:noFill/>
-            </p:spPr>
-            <p:txBody>
-              <a:bodyPr wrap="square">
-                <a:spAutoFit/>
-              </a:bodyPr>
-              <a:lstStyle/>
-              <a:p>
-                <a:pPr>
-                  <a:lnSpc>
-                    <a:spcPct val="107000"/>
-                  </a:lnSpc>
-                  <a:spcAft>
-                    <a:spcPts val="800"/>
-                  </a:spcAft>
-                </a:pPr>
-                <a:r>
-                  <a:rPr lang="fr-FR" sz="1200" dirty="0">
-                    <a:effectLst/>
-                    <a:latin typeface="Book Antiqua" panose="02040602050305030304" pitchFamily="18" charset="0"/>
-                    <a:ea typeface="Calibri" panose="020F0502020204030204" pitchFamily="34" charset="0"/>
-                    <a:cs typeface="Times New Roman" panose="02020603050405020304" pitchFamily="18" charset="0"/>
-                  </a:rPr>
-                  <a:t>Plans de formation</a:t>
-                </a:r>
-              </a:p>
-            </p:txBody>
-          </p:sp>
-          <p:grpSp>
-            <p:nvGrpSpPr>
-              <p:cNvPr id="27" name="Groupe 26">
-                <a:extLst>
-                  <a:ext uri="{FF2B5EF4-FFF2-40B4-BE49-F238E27FC236}">
-                    <a16:creationId xmlns:a16="http://schemas.microsoft.com/office/drawing/2014/main" id="{C138C3E1-76C7-B5F1-784B-4268394FAA73}"/>
-                  </a:ext>
-                </a:extLst>
-              </p:cNvPr>
-              <p:cNvGrpSpPr/>
-              <p:nvPr/>
-            </p:nvGrpSpPr>
-            <p:grpSpPr>
-              <a:xfrm>
-                <a:off x="5818452" y="2543514"/>
-                <a:ext cx="2079842" cy="885486"/>
-                <a:chOff x="7319531" y="2584526"/>
-                <a:chExt cx="2079842" cy="885486"/>
-              </a:xfrm>
-            </p:grpSpPr>
-            <p:sp>
-              <p:nvSpPr>
-                <p:cNvPr id="26" name="Parchemin : horizontal 25">
-                  <a:extLst>
-                    <a:ext uri="{FF2B5EF4-FFF2-40B4-BE49-F238E27FC236}">
-                      <a16:creationId xmlns:a16="http://schemas.microsoft.com/office/drawing/2014/main" id="{0FCCC1DB-C297-4757-9021-E56779F7B7DC}"/>
-                    </a:ext>
-                  </a:extLst>
-                </p:cNvPr>
-                <p:cNvSpPr/>
-                <p:nvPr/>
-              </p:nvSpPr>
-              <p:spPr>
-                <a:xfrm>
-                  <a:off x="7319531" y="2584526"/>
-                  <a:ext cx="2072753" cy="885486"/>
-                </a:xfrm>
-                <a:prstGeom prst="horizontalScroll">
-                  <a:avLst/>
-                </a:prstGeom>
-                <a:solidFill>
-                  <a:schemeClr val="accent1">
-                    <a:lumMod val="20000"/>
-                    <a:lumOff val="80000"/>
-                  </a:schemeClr>
-                </a:solidFill>
-                <a:ln>
-                  <a:solidFill>
-                    <a:schemeClr val="accent5"/>
-                  </a:solidFill>
-                </a:ln>
-              </p:spPr>
-              <p:style>
-                <a:lnRef idx="2">
-                  <a:schemeClr val="accent1">
-                    <a:shade val="50000"/>
-                  </a:schemeClr>
-                </a:lnRef>
-                <a:fillRef idx="1">
-                  <a:schemeClr val="accent1"/>
-                </a:fillRef>
-                <a:effectRef idx="0">
-                  <a:schemeClr val="accent1"/>
-                </a:effectRef>
-                <a:fontRef idx="minor">
-                  <a:schemeClr val="lt1"/>
-                </a:fontRef>
-              </p:style>
-              <p:txBody>
-                <a:bodyPr rtlCol="0" anchor="ctr"/>
-                <a:lstStyle/>
-                <a:p>
-                  <a:pPr algn="ctr"/>
-                  <a:endParaRPr lang="fr-FR"/>
-                </a:p>
-              </p:txBody>
-            </p:sp>
-            <p:sp>
-              <p:nvSpPr>
-                <p:cNvPr id="3" name="ZoneTexte 2">
-                  <a:extLst>
-                    <a:ext uri="{FF2B5EF4-FFF2-40B4-BE49-F238E27FC236}">
-                      <a16:creationId xmlns:a16="http://schemas.microsoft.com/office/drawing/2014/main" id="{39E74EE8-C0A2-9442-6AC0-6F88A2FD11E3}"/>
-                    </a:ext>
-                  </a:extLst>
-                </p:cNvPr>
-                <p:cNvSpPr txBox="1"/>
-                <p:nvPr/>
-              </p:nvSpPr>
-              <p:spPr>
-                <a:xfrm>
-                  <a:off x="7439996" y="2858596"/>
-                  <a:ext cx="1959377" cy="376385"/>
-                </a:xfrm>
-                <a:prstGeom prst="rect">
-                  <a:avLst/>
-                </a:prstGeom>
-                <a:noFill/>
-              </p:spPr>
-              <p:txBody>
-                <a:bodyPr wrap="square">
-                  <a:spAutoFit/>
-                </a:bodyPr>
-                <a:lstStyle/>
-                <a:p>
-                  <a:pPr>
-                    <a:lnSpc>
-                      <a:spcPct val="107000"/>
-                    </a:lnSpc>
-                    <a:spcAft>
-                      <a:spcPts val="800"/>
-                    </a:spcAft>
-                  </a:pPr>
-                  <a:r>
-                    <a:rPr lang="fr-FR" b="1" dirty="0">
-                      <a:solidFill>
-                        <a:schemeClr val="accent1">
-                          <a:lumMod val="50000"/>
-                        </a:schemeClr>
-                      </a:solidFill>
-                      <a:effectLst/>
-                      <a:latin typeface="Book Antiqua" panose="02040602050305030304" pitchFamily="18" charset="0"/>
-                      <a:ea typeface="Calibri" panose="020F0502020204030204" pitchFamily="34" charset="0"/>
-                      <a:cs typeface="Times New Roman" panose="02020603050405020304" pitchFamily="18" charset="0"/>
-                    </a:rPr>
-                    <a:t>RESKILLING !!!</a:t>
-                  </a:r>
-                </a:p>
-              </p:txBody>
-            </p:sp>
-          </p:grpSp>
-        </p:grpSp>
-      </p:grpSp>
+          <a:prstGeom prst="rect">
+            <a:avLst/>
+          </a:prstGeom>
+        </p:spPr>
+        <p:txBody>
+          <a:bodyPr vert="horz" lIns="91440" tIns="45720" rIns="91440" bIns="45720" rtlCol="0" anchor="b">
+            <a:normAutofit/>
+          </a:bodyPr>
+          <a:lstStyle>
+            <a:lvl1pPr>
+              <a:lnSpc>
+                <a:spcPct val="90000"/>
+              </a:lnSpc>
+              <a:spcBef>
+                <a:spcPct val="0"/>
+              </a:spcBef>
+              <a:buNone/>
+              <a:defRPr sz="4000">
+                <a:gradFill flip="none" rotWithShape="1">
+                  <a:gsLst>
+                    <a:gs pos="0">
+                      <a:schemeClr val="accent5">
+                        <a:alpha val="70000"/>
+                      </a:schemeClr>
+                    </a:gs>
+                    <a:gs pos="100000">
+                      <a:schemeClr val="accent1">
+                        <a:alpha val="70000"/>
+                      </a:schemeClr>
+                    </a:gs>
+                  </a:gsLst>
+                  <a:lin ang="0" scaled="1"/>
+                  <a:tileRect/>
+                </a:gradFill>
+                <a:latin typeface="+mj-lt"/>
+                <a:ea typeface="+mj-ea"/>
+                <a:cs typeface="+mj-cs"/>
+              </a:defRPr>
+            </a:lvl1pPr>
+          </a:lstStyle>
+          <a:p>
+            <a:r>
+              <a:rPr lang="fr-FR" dirty="0"/>
+              <a:t>Triggers/déclencheurs</a:t>
+            </a:r>
+          </a:p>
+        </p:txBody>
+      </p:sp>
       <p:sp>
         <p:nvSpPr>
-          <p:cNvPr id="2" name="Titre 1">
+          <p:cNvPr id="2" name="ZoneTexte 1">
             <a:extLst>
               <a:ext uri="{FF2B5EF4-FFF2-40B4-BE49-F238E27FC236}">
-                <a16:creationId xmlns:a16="http://schemas.microsoft.com/office/drawing/2014/main" id="{099E2E77-954A-DD7C-99BF-B9521D1A2115}"/>
+                <a16:creationId xmlns:a16="http://schemas.microsoft.com/office/drawing/2014/main" id="{820DCD84-3381-1332-C43A-FDF04F540A87}"/>
               </a:ext>
             </a:extLst>
           </p:cNvPr>
-          <p:cNvSpPr>
-            <a:spLocks noGrp="1"/>
-          </p:cNvSpPr>
-          <p:nvPr>
-            <p:ph type="title"/>
-          </p:nvPr>
+          <p:cNvSpPr txBox="1"/>
+          <p:nvPr/>
         </p:nvSpPr>
         <p:spPr>
           <a:xfrm>
-            <a:off x="912628" y="1055531"/>
-            <a:ext cx="10515600" cy="677750"/>
+            <a:off x="1217402" y="1184010"/>
+            <a:ext cx="6745981" cy="882934"/>
           </a:xfrm>
+          <a:prstGeom prst="rect">
+            <a:avLst/>
+          </a:prstGeom>
+          <a:noFill/>
         </p:spPr>
         <p:txBody>
-          <a:bodyPr>
-            <a:normAutofit/>
+          <a:bodyPr wrap="square">
+            <a:spAutoFit/>
           </a:bodyPr>
           <a:lstStyle/>
           <a:p>
-            <a:r>
-              <a:rPr lang="fr-FR" sz="3200" dirty="0"/>
-              <a:t>Contexte Société Générale</a:t>
+            <a:pPr marL="228600" indent="-228600">
+              <a:lnSpc>
+                <a:spcPct val="107000"/>
+              </a:lnSpc>
+              <a:spcAft>
+                <a:spcPts val="800"/>
+              </a:spcAft>
+              <a:buFont typeface="Wingdings" panose="05000000000000000000" pitchFamily="2" charset="2"/>
+              <a:buChar char="q"/>
+            </a:pPr>
+            <a:r>
+              <a:rPr lang="fr-FR" sz="1200" dirty="0" err="1">
+                <a:latin typeface="Book Antiqua" panose="02040602050305030304" pitchFamily="18" charset="0"/>
+                <a:ea typeface="Calibri" panose="020F0502020204030204" pitchFamily="34" charset="0"/>
+                <a:cs typeface="Times New Roman" panose="02020603050405020304" pitchFamily="18" charset="0"/>
+              </a:rPr>
+              <a:t>scritp</a:t>
+            </a:r>
+            <a:r>
+              <a:rPr lang="fr-FR" sz="1200" dirty="0">
+                <a:latin typeface="Book Antiqua" panose="02040602050305030304" pitchFamily="18" charset="0"/>
+                <a:ea typeface="Calibri" panose="020F0502020204030204" pitchFamily="34" charset="0"/>
+                <a:cs typeface="Times New Roman" panose="02020603050405020304" pitchFamily="18" charset="0"/>
+              </a:rPr>
+              <a:t> SQL</a:t>
+            </a:r>
+          </a:p>
+          <a:p>
+            <a:pPr marL="228600" indent="-228600">
+              <a:lnSpc>
+                <a:spcPct val="107000"/>
+              </a:lnSpc>
+              <a:spcAft>
+                <a:spcPts val="800"/>
+              </a:spcAft>
+              <a:buFont typeface="Wingdings" panose="05000000000000000000" pitchFamily="2" charset="2"/>
+              <a:buChar char="q"/>
+            </a:pPr>
+            <a:r>
+              <a:rPr lang="fr-FR" sz="1200" dirty="0">
+                <a:latin typeface="Book Antiqua" panose="02040602050305030304" pitchFamily="18" charset="0"/>
+                <a:ea typeface="Calibri" panose="020F0502020204030204" pitchFamily="34" charset="0"/>
+                <a:cs typeface="Times New Roman" panose="02020603050405020304" pitchFamily="18" charset="0"/>
+              </a:rPr>
+              <a:t>Rattachés à une base de données</a:t>
+            </a:r>
+          </a:p>
+          <a:p>
+            <a:pPr marL="228600" indent="-228600">
+              <a:lnSpc>
+                <a:spcPct val="107000"/>
+              </a:lnSpc>
+              <a:spcAft>
+                <a:spcPts val="800"/>
+              </a:spcAft>
+              <a:buFont typeface="Wingdings" panose="05000000000000000000" pitchFamily="2" charset="2"/>
+              <a:buChar char="q"/>
+            </a:pPr>
+            <a:r>
+              <a:rPr lang="fr-FR" sz="1200" dirty="0">
+                <a:latin typeface="Book Antiqua" panose="02040602050305030304" pitchFamily="18" charset="0"/>
+                <a:ea typeface="Calibri" panose="020F0502020204030204" pitchFamily="34" charset="0"/>
+                <a:cs typeface="Times New Roman" panose="02020603050405020304" pitchFamily="18" charset="0"/>
+              </a:rPr>
+              <a:t>Actions après/avant élément déclencheur (insert, update, </a:t>
+            </a:r>
+            <a:r>
+              <a:rPr lang="fr-FR" sz="1200" dirty="0" err="1">
+                <a:latin typeface="Book Antiqua" panose="02040602050305030304" pitchFamily="18" charset="0"/>
+                <a:ea typeface="Calibri" panose="020F0502020204030204" pitchFamily="34" charset="0"/>
+                <a:cs typeface="Times New Roman" panose="02020603050405020304" pitchFamily="18" charset="0"/>
+              </a:rPr>
+              <a:t>delete</a:t>
+            </a:r>
+            <a:r>
+              <a:rPr lang="fr-FR" sz="1200" dirty="0">
+                <a:latin typeface="Book Antiqua" panose="02040602050305030304" pitchFamily="18" charset="0"/>
+                <a:ea typeface="Calibri" panose="020F0502020204030204" pitchFamily="34" charset="0"/>
+                <a:cs typeface="Times New Roman" panose="02020603050405020304" pitchFamily="18" charset="0"/>
+              </a:rPr>
+              <a:t>)</a:t>
             </a:r>
           </a:p>
         </p:txBody>
       </p:sp>
       <p:pic>
         <p:nvPicPr>
-          <p:cNvPr id="7" name="Espace réservé du contenu 6" descr="Une image contenant flèche&#10;&#10;Description générée automatiquement">
+          <p:cNvPr id="4" name="Image 3">
             <a:extLst>
               <a:ext uri="{FF2B5EF4-FFF2-40B4-BE49-F238E27FC236}">
-                <a16:creationId xmlns:a16="http://schemas.microsoft.com/office/drawing/2014/main" id="{520C8AB2-C7FA-4E85-F4DE-20ECC580ACB0}"/>
+                <a16:creationId xmlns:a16="http://schemas.microsoft.com/office/drawing/2014/main" id="{08E7F2B2-523A-D57F-569E-1456F89669E7}"/>
               </a:ext>
             </a:extLst>
           </p:cNvPr>
           <p:cNvPicPr>
-            <a:picLocks noGrp="1" noChangeAspect="1"/>
+            <a:picLocks noChangeAspect="1"/>
           </p:cNvPicPr>
-          <p:nvPr>
-            <p:ph idx="1"/>
-          </p:nvPr>
+          <p:nvPr/>
         </p:nvPicPr>
         <p:blipFill>
           <a:blip r:embed="rId2">
+            <a:extLst>
+              <a:ext uri="{28A0092B-C50C-407E-A947-70E740481C1C}">
+                <a14:useLocalDpi xmlns:a14="http://schemas.microsoft.com/office/drawing/2010/main" val="0"/>
+              </a:ext>
+            </a:extLst>
+          </a:blip>
+          <a:srcRect/>
+          <a:stretch>
+            <a:fillRect/>
+          </a:stretch>
+        </p:blipFill>
+        <p:spPr bwMode="auto">
+          <a:xfrm>
+            <a:off x="846954" y="2361722"/>
+            <a:ext cx="5405755" cy="3529965"/>
+          </a:xfrm>
+          <a:prstGeom prst="rect">
+            <a:avLst/>
+          </a:prstGeom>
+          <a:noFill/>
+          <a:ln>
+            <a:noFill/>
+          </a:ln>
+        </p:spPr>
+      </p:pic>
+      <p:pic>
+        <p:nvPicPr>
+          <p:cNvPr id="5" name="Image 4">
+            <a:extLst>
+              <a:ext uri="{FF2B5EF4-FFF2-40B4-BE49-F238E27FC236}">
+                <a16:creationId xmlns:a16="http://schemas.microsoft.com/office/drawing/2014/main" id="{BA1E7439-4313-3A2F-9306-34AE9FC75E1C}"/>
+              </a:ext>
+            </a:extLst>
+          </p:cNvPr>
+          <p:cNvPicPr>
+            <a:picLocks noChangeAspect="1"/>
+          </p:cNvPicPr>
+          <p:nvPr/>
+        </p:nvPicPr>
+        <p:blipFill>
+          <a:blip r:embed="rId3">
             <a:extLst>
               <a:ext uri="{28A0092B-C50C-407E-A947-70E740481C1C}">
                 <a14:useLocalDpi xmlns:a14="http://schemas.microsoft.com/office/drawing/2010/main" val="0"/>
@@ -19462,922 +19321,55 @@
         </p:blipFill>
         <p:spPr>
           <a:xfrm>
-            <a:off x="8651561" y="681038"/>
-            <a:ext cx="1186827" cy="1186827"/>
+            <a:off x="6571071" y="2361722"/>
+            <a:ext cx="4075158" cy="3576878"/>
           </a:xfrm>
+          <a:prstGeom prst="rect">
+            <a:avLst/>
+          </a:prstGeom>
+          <a:ln>
+            <a:gradFill>
+              <a:gsLst>
+                <a:gs pos="0">
+                  <a:schemeClr val="accent1">
+                    <a:lumMod val="5000"/>
+                    <a:lumOff val="95000"/>
+                  </a:schemeClr>
+                </a:gs>
+                <a:gs pos="74000">
+                  <a:schemeClr val="accent1">
+                    <a:lumMod val="45000"/>
+                    <a:lumOff val="55000"/>
+                  </a:schemeClr>
+                </a:gs>
+                <a:gs pos="83000">
+                  <a:schemeClr val="accent1">
+                    <a:lumMod val="45000"/>
+                    <a:lumOff val="55000"/>
+                  </a:schemeClr>
+                </a:gs>
+                <a:gs pos="100000">
+                  <a:schemeClr val="accent1">
+                    <a:lumMod val="30000"/>
+                    <a:lumOff val="70000"/>
+                  </a:schemeClr>
+                </a:gs>
+              </a:gsLst>
+              <a:lin ang="5400000" scaled="1"/>
+            </a:gradFill>
+          </a:ln>
         </p:spPr>
       </p:pic>
-      <p:grpSp>
-        <p:nvGrpSpPr>
-          <p:cNvPr id="13" name="Groupe 12">
-            <a:extLst>
-              <a:ext uri="{FF2B5EF4-FFF2-40B4-BE49-F238E27FC236}">
-                <a16:creationId xmlns:a16="http://schemas.microsoft.com/office/drawing/2014/main" id="{8FE30EE8-9561-2EF7-8767-44261BF496DE}"/>
-              </a:ext>
-            </a:extLst>
-          </p:cNvPr>
-          <p:cNvGrpSpPr/>
-          <p:nvPr/>
-        </p:nvGrpSpPr>
-        <p:grpSpPr>
-          <a:xfrm>
-            <a:off x="1641485" y="3936395"/>
-            <a:ext cx="3331672" cy="1651149"/>
-            <a:chOff x="2018416" y="2563628"/>
-            <a:chExt cx="7920410" cy="1651149"/>
-          </a:xfrm>
-        </p:grpSpPr>
-        <p:sp>
-          <p:nvSpPr>
-            <p:cNvPr id="6" name="ZoneTexte 5">
-              <a:extLst>
-                <a:ext uri="{FF2B5EF4-FFF2-40B4-BE49-F238E27FC236}">
-                  <a16:creationId xmlns:a16="http://schemas.microsoft.com/office/drawing/2014/main" id="{14A758CC-D953-92A8-7091-B2C502398684}"/>
-                </a:ext>
-              </a:extLst>
-            </p:cNvPr>
-            <p:cNvSpPr txBox="1"/>
-            <p:nvPr/>
-          </p:nvSpPr>
-          <p:spPr>
-            <a:xfrm>
-              <a:off x="2267281" y="3031633"/>
-              <a:ext cx="7263076" cy="1183144"/>
-            </a:xfrm>
-            <a:prstGeom prst="rect">
-              <a:avLst/>
-            </a:prstGeom>
-            <a:noFill/>
-          </p:spPr>
-          <p:txBody>
-            <a:bodyPr wrap="square">
-              <a:spAutoFit/>
-            </a:bodyPr>
-            <a:lstStyle/>
-            <a:p>
-              <a:pPr marL="228600" indent="-228600">
-                <a:lnSpc>
-                  <a:spcPct val="107000"/>
-                </a:lnSpc>
-                <a:spcAft>
-                  <a:spcPts val="800"/>
-                </a:spcAft>
-                <a:buFont typeface="Wingdings" panose="05000000000000000000" pitchFamily="2" charset="2"/>
-                <a:buChar char="q"/>
-              </a:pPr>
-              <a:r>
-                <a:rPr lang="fr-FR" sz="1200" dirty="0">
-                  <a:latin typeface="Book Antiqua" panose="02040602050305030304" pitchFamily="18" charset="0"/>
-                  <a:ea typeface="Calibri" panose="020F0502020204030204" pitchFamily="34" charset="0"/>
-                  <a:cs typeface="Times New Roman" panose="02020603050405020304" pitchFamily="18" charset="0"/>
-                </a:rPr>
-                <a:t>Support</a:t>
-              </a:r>
-            </a:p>
-            <a:p>
-              <a:pPr marL="228600" indent="-228600">
-                <a:lnSpc>
-                  <a:spcPct val="107000"/>
-                </a:lnSpc>
-                <a:spcAft>
-                  <a:spcPts val="800"/>
-                </a:spcAft>
-                <a:buFont typeface="Wingdings" panose="05000000000000000000" pitchFamily="2" charset="2"/>
-                <a:buChar char="q"/>
-              </a:pPr>
-              <a:r>
-                <a:rPr lang="fr-FR" sz="1200" dirty="0">
-                  <a:latin typeface="Book Antiqua" panose="02040602050305030304" pitchFamily="18" charset="0"/>
-                  <a:ea typeface="Calibri" panose="020F0502020204030204" pitchFamily="34" charset="0"/>
-                  <a:cs typeface="Times New Roman" panose="02020603050405020304" pitchFamily="18" charset="0"/>
-                </a:rPr>
-                <a:t>Maintenance</a:t>
-              </a:r>
-            </a:p>
-            <a:p>
-              <a:pPr marL="228600" indent="-228600">
-                <a:lnSpc>
-                  <a:spcPct val="107000"/>
-                </a:lnSpc>
-                <a:spcAft>
-                  <a:spcPts val="800"/>
-                </a:spcAft>
-                <a:buFont typeface="Wingdings" panose="05000000000000000000" pitchFamily="2" charset="2"/>
-                <a:buChar char="q"/>
-              </a:pPr>
-              <a:r>
-                <a:rPr lang="fr-FR" sz="1200" dirty="0">
-                  <a:latin typeface="Book Antiqua" panose="02040602050305030304" pitchFamily="18" charset="0"/>
-                  <a:ea typeface="Calibri" panose="020F0502020204030204" pitchFamily="34" charset="0"/>
-                  <a:cs typeface="Times New Roman" panose="02020603050405020304" pitchFamily="18" charset="0"/>
-                </a:rPr>
-                <a:t>Développement</a:t>
-              </a:r>
-            </a:p>
-            <a:p>
-              <a:pPr marL="228600" indent="-228600">
-                <a:lnSpc>
-                  <a:spcPct val="107000"/>
-                </a:lnSpc>
-                <a:spcAft>
-                  <a:spcPts val="800"/>
-                </a:spcAft>
-                <a:buFont typeface="Wingdings" panose="05000000000000000000" pitchFamily="2" charset="2"/>
-                <a:buChar char="q"/>
-              </a:pPr>
-              <a:r>
-                <a:rPr lang="fr-FR" sz="1200" dirty="0">
-                  <a:latin typeface="Book Antiqua" panose="02040602050305030304" pitchFamily="18" charset="0"/>
-                  <a:ea typeface="Calibri" panose="020F0502020204030204" pitchFamily="34" charset="0"/>
-                  <a:cs typeface="Times New Roman" panose="02020603050405020304" pitchFamily="18" charset="0"/>
-                </a:rPr>
-                <a:t>Tests de non régression</a:t>
-              </a:r>
-            </a:p>
-          </p:txBody>
-        </p:sp>
-        <p:sp>
-          <p:nvSpPr>
-            <p:cNvPr id="8" name="Titre 1">
-              <a:extLst>
-                <a:ext uri="{FF2B5EF4-FFF2-40B4-BE49-F238E27FC236}">
-                  <a16:creationId xmlns:a16="http://schemas.microsoft.com/office/drawing/2014/main" id="{472F6CE5-DE74-A322-A738-C53D7DBFF9E6}"/>
-                </a:ext>
-              </a:extLst>
-            </p:cNvPr>
-            <p:cNvSpPr txBox="1">
-              <a:spLocks/>
-            </p:cNvSpPr>
-            <p:nvPr/>
-          </p:nvSpPr>
-          <p:spPr>
-            <a:xfrm>
-              <a:off x="2018416" y="2563628"/>
-              <a:ext cx="7920410" cy="547115"/>
-            </a:xfrm>
-            <a:prstGeom prst="rect">
-              <a:avLst/>
-            </a:prstGeom>
-          </p:spPr>
-          <p:txBody>
-            <a:bodyPr vert="horz" lIns="91440" tIns="45720" rIns="91440" bIns="45720" rtlCol="0" anchor="ctr">
-              <a:normAutofit fontScale="70000" lnSpcReduction="20000"/>
-            </a:bodyPr>
-            <a:lstStyle>
-              <a:lvl1pPr marL="0" algn="l" defTabSz="914400" rtl="0" eaLnBrk="1" latinLnBrk="0" hangingPunct="1">
-                <a:lnSpc>
-                  <a:spcPct val="90000"/>
-                </a:lnSpc>
-                <a:spcBef>
-                  <a:spcPct val="0"/>
-                </a:spcBef>
-                <a:buNone/>
-                <a:defRPr lang="en-US" sz="5200" kern="1200" dirty="0">
-                  <a:gradFill flip="none" rotWithShape="1">
-                    <a:gsLst>
-                      <a:gs pos="0">
-                        <a:schemeClr val="accent5"/>
-                      </a:gs>
-                      <a:gs pos="100000">
-                        <a:schemeClr val="accent1">
-                          <a:alpha val="70000"/>
-                        </a:schemeClr>
-                      </a:gs>
-                    </a:gsLst>
-                    <a:lin ang="0" scaled="1"/>
-                    <a:tileRect/>
-                  </a:gradFill>
-                  <a:latin typeface="+mj-lt"/>
-                  <a:ea typeface="+mn-ea"/>
-                  <a:cs typeface="Angsana New" panose="02020603050405020304" pitchFamily="18" charset="-34"/>
-                </a:defRPr>
-              </a:lvl1pPr>
-            </a:lstStyle>
-            <a:p>
-              <a:r>
-                <a:rPr lang="fr-FR" sz="2800" dirty="0" err="1"/>
-                <a:t>Xone</a:t>
-              </a:r>
-              <a:r>
-                <a:rPr lang="fr-FR" sz="2800" dirty="0"/>
-                <a:t> : SI gestion transactions banque d’investissements</a:t>
-              </a:r>
-            </a:p>
-          </p:txBody>
-        </p:sp>
-      </p:grpSp>
-      <p:grpSp>
-        <p:nvGrpSpPr>
-          <p:cNvPr id="14" name="Groupe 13">
-            <a:extLst>
-              <a:ext uri="{FF2B5EF4-FFF2-40B4-BE49-F238E27FC236}">
-                <a16:creationId xmlns:a16="http://schemas.microsoft.com/office/drawing/2014/main" id="{BEC458D6-1D51-F331-1ED9-1E0518CD31F9}"/>
-              </a:ext>
-            </a:extLst>
-          </p:cNvPr>
-          <p:cNvGrpSpPr/>
-          <p:nvPr/>
-        </p:nvGrpSpPr>
-        <p:grpSpPr>
-          <a:xfrm>
-            <a:off x="5938917" y="4354684"/>
-            <a:ext cx="3354499" cy="1435824"/>
-            <a:chOff x="3494165" y="4326196"/>
-            <a:chExt cx="3407656" cy="1435824"/>
-          </a:xfrm>
-        </p:grpSpPr>
-        <p:sp>
-          <p:nvSpPr>
-            <p:cNvPr id="11" name="Titre 1">
-              <a:extLst>
-                <a:ext uri="{FF2B5EF4-FFF2-40B4-BE49-F238E27FC236}">
-                  <a16:creationId xmlns:a16="http://schemas.microsoft.com/office/drawing/2014/main" id="{2A0F28B1-E086-F076-13D2-63284AC23C49}"/>
-                </a:ext>
-              </a:extLst>
-            </p:cNvPr>
-            <p:cNvSpPr txBox="1">
-              <a:spLocks/>
-            </p:cNvSpPr>
-            <p:nvPr/>
-          </p:nvSpPr>
-          <p:spPr>
-            <a:xfrm>
-              <a:off x="3494165" y="4326196"/>
-              <a:ext cx="3172106" cy="550333"/>
-            </a:xfrm>
-            <a:prstGeom prst="rect">
-              <a:avLst/>
-            </a:prstGeom>
-          </p:spPr>
-          <p:txBody>
-            <a:bodyPr vert="horz" lIns="91440" tIns="45720" rIns="91440" bIns="45720" rtlCol="0" anchor="ctr">
-              <a:noAutofit/>
-            </a:bodyPr>
-            <a:lstStyle>
-              <a:lvl1pPr marL="0" algn="l" defTabSz="914400" rtl="0" eaLnBrk="1" latinLnBrk="0" hangingPunct="1">
-                <a:lnSpc>
-                  <a:spcPct val="90000"/>
-                </a:lnSpc>
-                <a:spcBef>
-                  <a:spcPct val="0"/>
-                </a:spcBef>
-                <a:buNone/>
-                <a:defRPr lang="en-US" sz="5200" kern="1200" dirty="0">
-                  <a:gradFill flip="none" rotWithShape="1">
-                    <a:gsLst>
-                      <a:gs pos="0">
-                        <a:schemeClr val="accent5"/>
-                      </a:gs>
-                      <a:gs pos="100000">
-                        <a:schemeClr val="accent1">
-                          <a:alpha val="70000"/>
-                        </a:schemeClr>
-                      </a:gs>
-                    </a:gsLst>
-                    <a:lin ang="0" scaled="1"/>
-                    <a:tileRect/>
-                  </a:gradFill>
-                  <a:latin typeface="+mj-lt"/>
-                  <a:ea typeface="+mn-ea"/>
-                  <a:cs typeface="Angsana New" panose="02020603050405020304" pitchFamily="18" charset="-34"/>
-                </a:defRPr>
-              </a:lvl1pPr>
-            </a:lstStyle>
-            <a:p>
-              <a:r>
-                <a:rPr lang="fr-FR" sz="2000" dirty="0"/>
-                <a:t>Et moi dans tout ça…</a:t>
-              </a:r>
-            </a:p>
-          </p:txBody>
-        </p:sp>
-        <p:sp>
-          <p:nvSpPr>
-            <p:cNvPr id="12" name="ZoneTexte 11">
-              <a:extLst>
-                <a:ext uri="{FF2B5EF4-FFF2-40B4-BE49-F238E27FC236}">
-                  <a16:creationId xmlns:a16="http://schemas.microsoft.com/office/drawing/2014/main" id="{FEE3E477-56C2-2997-D394-91FD365149F5}"/>
-                </a:ext>
-              </a:extLst>
-            </p:cNvPr>
-            <p:cNvSpPr txBox="1"/>
-            <p:nvPr/>
-          </p:nvSpPr>
-          <p:spPr>
-            <a:xfrm>
-              <a:off x="3729715" y="4879086"/>
-              <a:ext cx="3172106" cy="882934"/>
-            </a:xfrm>
-            <a:prstGeom prst="rect">
-              <a:avLst/>
-            </a:prstGeom>
-            <a:noFill/>
-          </p:spPr>
-          <p:txBody>
-            <a:bodyPr wrap="square">
-              <a:spAutoFit/>
-            </a:bodyPr>
-            <a:lstStyle/>
-            <a:p>
-              <a:pPr marL="285750" indent="-285750">
-                <a:lnSpc>
-                  <a:spcPct val="107000"/>
-                </a:lnSpc>
-                <a:spcAft>
-                  <a:spcPts val="800"/>
-                </a:spcAft>
-                <a:buFont typeface="Wingdings" panose="05000000000000000000" pitchFamily="2" charset="2"/>
-                <a:buChar char="q"/>
-              </a:pPr>
-              <a:r>
-                <a:rPr lang="fr-FR" sz="1200" dirty="0" err="1">
-                  <a:latin typeface="Book Antiqua" panose="02040602050305030304" pitchFamily="18" charset="0"/>
-                  <a:ea typeface="Calibri" panose="020F0502020204030204" pitchFamily="34" charset="0"/>
-                  <a:cs typeface="Times New Roman" panose="02020603050405020304" pitchFamily="18" charset="0"/>
-                </a:rPr>
-                <a:t>Reskilling</a:t>
-              </a:r>
-              <a:r>
-                <a:rPr lang="fr-FR" sz="1200" dirty="0">
-                  <a:latin typeface="Book Antiqua" panose="02040602050305030304" pitchFamily="18" charset="0"/>
-                  <a:ea typeface="Calibri" panose="020F0502020204030204" pitchFamily="34" charset="0"/>
-                  <a:cs typeface="Times New Roman" panose="02020603050405020304" pitchFamily="18" charset="0"/>
-                </a:rPr>
-                <a:t> pour changer de carrière</a:t>
-              </a:r>
-            </a:p>
-            <a:p>
-              <a:pPr marL="285750" indent="-285750">
-                <a:lnSpc>
-                  <a:spcPct val="107000"/>
-                </a:lnSpc>
-                <a:spcAft>
-                  <a:spcPts val="800"/>
-                </a:spcAft>
-                <a:buFont typeface="Wingdings" panose="05000000000000000000" pitchFamily="2" charset="2"/>
-                <a:buChar char="q"/>
-              </a:pPr>
-              <a:r>
-                <a:rPr lang="fr-FR" sz="1200" dirty="0">
-                  <a:latin typeface="Book Antiqua" panose="02040602050305030304" pitchFamily="18" charset="0"/>
-                  <a:ea typeface="Calibri" panose="020F0502020204030204" pitchFamily="34" charset="0"/>
-                  <a:cs typeface="Times New Roman" panose="02020603050405020304" pitchFamily="18" charset="0"/>
-                </a:rPr>
-                <a:t>Développement</a:t>
-              </a:r>
-            </a:p>
-            <a:p>
-              <a:pPr marL="285750" indent="-285750">
-                <a:lnSpc>
-                  <a:spcPct val="107000"/>
-                </a:lnSpc>
-                <a:spcAft>
-                  <a:spcPts val="800"/>
-                </a:spcAft>
-                <a:buFont typeface="Wingdings" panose="05000000000000000000" pitchFamily="2" charset="2"/>
-                <a:buChar char="q"/>
-              </a:pPr>
-              <a:r>
-                <a:rPr lang="fr-FR" sz="1200" dirty="0">
-                  <a:latin typeface="Book Antiqua" panose="02040602050305030304" pitchFamily="18" charset="0"/>
-                  <a:ea typeface="Calibri" panose="020F0502020204030204" pitchFamily="34" charset="0"/>
-                  <a:cs typeface="Times New Roman" panose="02020603050405020304" pitchFamily="18" charset="0"/>
-                </a:rPr>
-                <a:t>Tests</a:t>
-              </a:r>
-            </a:p>
-          </p:txBody>
-        </p:sp>
-      </p:grpSp>
-      <p:grpSp>
-        <p:nvGrpSpPr>
-          <p:cNvPr id="21" name="Groupe 20">
-            <a:extLst>
-              <a:ext uri="{FF2B5EF4-FFF2-40B4-BE49-F238E27FC236}">
-                <a16:creationId xmlns:a16="http://schemas.microsoft.com/office/drawing/2014/main" id="{92EAA6D7-56A5-5270-EA19-981AC0441369}"/>
-              </a:ext>
-            </a:extLst>
-          </p:cNvPr>
-          <p:cNvGrpSpPr/>
-          <p:nvPr/>
-        </p:nvGrpSpPr>
-        <p:grpSpPr>
-          <a:xfrm>
-            <a:off x="1110107" y="1933295"/>
-            <a:ext cx="2594395" cy="535981"/>
-            <a:chOff x="1148177" y="1711362"/>
-            <a:chExt cx="2594395" cy="535981"/>
-          </a:xfrm>
-        </p:grpSpPr>
-        <p:sp>
-          <p:nvSpPr>
-            <p:cNvPr id="9" name="ZoneTexte 8">
-              <a:extLst>
-                <a:ext uri="{FF2B5EF4-FFF2-40B4-BE49-F238E27FC236}">
-                  <a16:creationId xmlns:a16="http://schemas.microsoft.com/office/drawing/2014/main" id="{BC23ED4F-C6A3-6A63-6E53-A21EC4FABCD5}"/>
-                </a:ext>
-              </a:extLst>
-            </p:cNvPr>
-            <p:cNvSpPr txBox="1"/>
-            <p:nvPr/>
-          </p:nvSpPr>
-          <p:spPr>
-            <a:xfrm>
-              <a:off x="1148177" y="1805908"/>
-              <a:ext cx="2594395" cy="282321"/>
-            </a:xfrm>
-            <a:prstGeom prst="rect">
-              <a:avLst/>
-            </a:prstGeom>
-            <a:noFill/>
-          </p:spPr>
-          <p:txBody>
-            <a:bodyPr wrap="square">
-              <a:spAutoFit/>
-            </a:bodyPr>
-            <a:lstStyle/>
-            <a:p>
-              <a:pPr>
-                <a:lnSpc>
-                  <a:spcPct val="107000"/>
-                </a:lnSpc>
-                <a:spcAft>
-                  <a:spcPts val="800"/>
-                </a:spcAft>
-              </a:pPr>
-              <a:r>
-                <a:rPr lang="fr-FR" sz="1200" dirty="0">
-                  <a:effectLst/>
-                  <a:latin typeface="Book Antiqua" panose="02040602050305030304" pitchFamily="18" charset="0"/>
-                  <a:ea typeface="Calibri" panose="020F0502020204030204" pitchFamily="34" charset="0"/>
-                  <a:cs typeface="Times New Roman" panose="02020603050405020304" pitchFamily="18" charset="0"/>
-                </a:rPr>
-                <a:t>Besoin en informatiques</a:t>
-              </a:r>
-              <a:endParaRPr lang="fr-FR" sz="2800" b="1" dirty="0">
-                <a:solidFill>
-                  <a:schemeClr val="accent6">
-                    <a:lumMod val="75000"/>
-                  </a:schemeClr>
-                </a:solidFill>
-                <a:effectLst/>
-                <a:latin typeface="Book Antiqua" panose="02040602050305030304" pitchFamily="18" charset="0"/>
-                <a:ea typeface="Calibri" panose="020F0502020204030204" pitchFamily="34" charset="0"/>
-                <a:cs typeface="Times New Roman" panose="02020603050405020304" pitchFamily="18" charset="0"/>
-              </a:endParaRPr>
-            </a:p>
-          </p:txBody>
-        </p:sp>
-        <p:sp>
-          <p:nvSpPr>
-            <p:cNvPr id="18" name="ZoneTexte 17">
-              <a:extLst>
-                <a:ext uri="{FF2B5EF4-FFF2-40B4-BE49-F238E27FC236}">
-                  <a16:creationId xmlns:a16="http://schemas.microsoft.com/office/drawing/2014/main" id="{118B1DFB-43CD-2307-85EC-71817F8A30A1}"/>
-                </a:ext>
-              </a:extLst>
-            </p:cNvPr>
-            <p:cNvSpPr txBox="1"/>
-            <p:nvPr/>
-          </p:nvSpPr>
-          <p:spPr>
-            <a:xfrm>
-              <a:off x="2871872" y="1711362"/>
-              <a:ext cx="870700" cy="535981"/>
-            </a:xfrm>
-            <a:prstGeom prst="rect">
-              <a:avLst/>
-            </a:prstGeom>
-            <a:noFill/>
-          </p:spPr>
-          <p:txBody>
-            <a:bodyPr wrap="square">
-              <a:spAutoFit/>
-            </a:bodyPr>
-            <a:lstStyle/>
-            <a:p>
-              <a:pPr>
-                <a:lnSpc>
-                  <a:spcPct val="107000"/>
-                </a:lnSpc>
-                <a:spcAft>
-                  <a:spcPts val="800"/>
-                </a:spcAft>
-              </a:pPr>
-              <a:r>
-                <a:rPr lang="fr-FR" sz="2800" b="1" dirty="0">
-                  <a:solidFill>
-                    <a:schemeClr val="accent6">
-                      <a:lumMod val="75000"/>
-                    </a:schemeClr>
-                  </a:solidFill>
-                  <a:effectLst/>
-                  <a:latin typeface="Book Antiqua" panose="02040602050305030304" pitchFamily="18" charset="0"/>
-                  <a:ea typeface="Calibri" panose="020F0502020204030204" pitchFamily="34" charset="0"/>
-                  <a:cs typeface="Times New Roman" panose="02020603050405020304" pitchFamily="18" charset="0"/>
-                </a:rPr>
-                <a:t>+++</a:t>
-              </a:r>
-            </a:p>
-          </p:txBody>
-        </p:sp>
-      </p:grpSp>
-      <p:grpSp>
-        <p:nvGrpSpPr>
-          <p:cNvPr id="22" name="Groupe 21">
-            <a:extLst>
-              <a:ext uri="{FF2B5EF4-FFF2-40B4-BE49-F238E27FC236}">
-                <a16:creationId xmlns:a16="http://schemas.microsoft.com/office/drawing/2014/main" id="{851BF32D-2CBE-14D1-C34E-5E842427B373}"/>
-              </a:ext>
-            </a:extLst>
-          </p:cNvPr>
-          <p:cNvGrpSpPr/>
-          <p:nvPr/>
-        </p:nvGrpSpPr>
-        <p:grpSpPr>
-          <a:xfrm>
-            <a:off x="1383159" y="2282108"/>
-            <a:ext cx="2160392" cy="535981"/>
-            <a:chOff x="1649198" y="2080123"/>
-            <a:chExt cx="2160392" cy="535981"/>
-          </a:xfrm>
-        </p:grpSpPr>
-        <p:sp>
-          <p:nvSpPr>
-            <p:cNvPr id="19" name="ZoneTexte 18">
-              <a:extLst>
-                <a:ext uri="{FF2B5EF4-FFF2-40B4-BE49-F238E27FC236}">
-                  <a16:creationId xmlns:a16="http://schemas.microsoft.com/office/drawing/2014/main" id="{8D9A0323-DC8B-2862-D066-BF4DD1001C57}"/>
-                </a:ext>
-              </a:extLst>
-            </p:cNvPr>
-            <p:cNvSpPr txBox="1"/>
-            <p:nvPr/>
-          </p:nvSpPr>
-          <p:spPr>
-            <a:xfrm>
-              <a:off x="1649198" y="2205159"/>
-              <a:ext cx="2147688" cy="282321"/>
-            </a:xfrm>
-            <a:prstGeom prst="rect">
-              <a:avLst/>
-            </a:prstGeom>
-            <a:noFill/>
-          </p:spPr>
-          <p:txBody>
-            <a:bodyPr wrap="square">
-              <a:spAutoFit/>
-            </a:bodyPr>
-            <a:lstStyle/>
-            <a:p>
-              <a:pPr>
-                <a:lnSpc>
-                  <a:spcPct val="107000"/>
-                </a:lnSpc>
-                <a:spcAft>
-                  <a:spcPts val="800"/>
-                </a:spcAft>
-              </a:pPr>
-              <a:r>
-                <a:rPr lang="fr-FR" sz="1200" dirty="0">
-                  <a:effectLst/>
-                  <a:latin typeface="Book Antiqua" panose="02040602050305030304" pitchFamily="18" charset="0"/>
-                  <a:ea typeface="Calibri" panose="020F0502020204030204" pitchFamily="34" charset="0"/>
-                  <a:cs typeface="Times New Roman" panose="02020603050405020304" pitchFamily="18" charset="0"/>
-                </a:rPr>
-                <a:t>Besoin métiers</a:t>
-              </a:r>
-              <a:endParaRPr lang="fr-FR" sz="2800" b="1" dirty="0">
-                <a:solidFill>
-                  <a:schemeClr val="accent6">
-                    <a:lumMod val="75000"/>
-                  </a:schemeClr>
-                </a:solidFill>
-                <a:effectLst/>
-                <a:latin typeface="Book Antiqua" panose="02040602050305030304" pitchFamily="18" charset="0"/>
-                <a:ea typeface="Calibri" panose="020F0502020204030204" pitchFamily="34" charset="0"/>
-                <a:cs typeface="Times New Roman" panose="02020603050405020304" pitchFamily="18" charset="0"/>
-              </a:endParaRPr>
-            </a:p>
-          </p:txBody>
-        </p:sp>
-        <p:sp>
-          <p:nvSpPr>
-            <p:cNvPr id="20" name="ZoneTexte 19">
-              <a:extLst>
-                <a:ext uri="{FF2B5EF4-FFF2-40B4-BE49-F238E27FC236}">
-                  <a16:creationId xmlns:a16="http://schemas.microsoft.com/office/drawing/2014/main" id="{3F9661F0-037A-81C3-15B8-F95A4D633225}"/>
-                </a:ext>
-              </a:extLst>
-            </p:cNvPr>
-            <p:cNvSpPr txBox="1"/>
-            <p:nvPr/>
-          </p:nvSpPr>
-          <p:spPr>
-            <a:xfrm>
-              <a:off x="2938890" y="2080123"/>
-              <a:ext cx="870700" cy="535981"/>
-            </a:xfrm>
-            <a:prstGeom prst="rect">
-              <a:avLst/>
-            </a:prstGeom>
-            <a:noFill/>
-          </p:spPr>
-          <p:txBody>
-            <a:bodyPr wrap="square">
-              <a:spAutoFit/>
-            </a:bodyPr>
-            <a:lstStyle/>
-            <a:p>
-              <a:pPr>
-                <a:lnSpc>
-                  <a:spcPct val="107000"/>
-                </a:lnSpc>
-                <a:spcAft>
-                  <a:spcPts val="800"/>
-                </a:spcAft>
-              </a:pPr>
-              <a:r>
-                <a:rPr lang="fr-FR" sz="2800" b="1" dirty="0">
-                  <a:solidFill>
-                    <a:srgbClr val="FF0000"/>
-                  </a:solidFill>
-                  <a:effectLst/>
-                  <a:latin typeface="Book Antiqua" panose="02040602050305030304" pitchFamily="18" charset="0"/>
-                  <a:ea typeface="Calibri" panose="020F0502020204030204" pitchFamily="34" charset="0"/>
-                  <a:cs typeface="Times New Roman" panose="02020603050405020304" pitchFamily="18" charset="0"/>
-                </a:rPr>
-                <a:t>- - -</a:t>
-              </a:r>
-            </a:p>
-          </p:txBody>
-        </p:sp>
-      </p:grpSp>
     </p:spTree>
     <p:extLst>
       <p:ext uri="{BB962C8B-B14F-4D97-AF65-F5344CB8AC3E}">
-        <p14:creationId xmlns:p14="http://schemas.microsoft.com/office/powerpoint/2010/main" val="1353371378"/>
+        <p14:creationId xmlns:p14="http://schemas.microsoft.com/office/powerpoint/2010/main" val="818808910"/>
       </p:ext>
     </p:extLst>
   </p:cSld>
   <p:clrMapOvr>
     <a:masterClrMapping/>
   </p:clrMapOvr>
-  <p:timing>
-    <p:tnLst>
-      <p:par>
-        <p:cTn id="1" dur="indefinite" restart="never" nodeType="tmRoot">
-          <p:childTnLst>
-            <p:seq concurrent="1" nextAc="seek">
-              <p:cTn id="2" dur="indefinite" nodeType="mainSeq">
-                <p:childTnLst>
-                  <p:par>
-                    <p:cTn id="3" fill="hold">
-                      <p:stCondLst>
-                        <p:cond delay="indefinite"/>
-                      </p:stCondLst>
-                      <p:childTnLst>
-                        <p:par>
-                          <p:cTn id="4" fill="hold">
-                            <p:stCondLst>
-                              <p:cond delay="0"/>
-                            </p:stCondLst>
-                            <p:childTnLst>
-                              <p:par>
-                                <p:cTn id="5" presetID="1" presetClass="entr" presetSubtype="0" fill="hold" nodeType="clickEffect">
-                                  <p:stCondLst>
-                                    <p:cond delay="0"/>
-                                  </p:stCondLst>
-                                  <p:childTnLst>
-                                    <p:set>
-                                      <p:cBhvr>
-                                        <p:cTn id="6" dur="1" fill="hold">
-                                          <p:stCondLst>
-                                            <p:cond delay="0"/>
-                                          </p:stCondLst>
-                                        </p:cTn>
-                                        <p:tgtEl>
-                                          <p:spTgt spid="21"/>
-                                        </p:tgtEl>
-                                        <p:attrNameLst>
-                                          <p:attrName>style.visibility</p:attrName>
-                                        </p:attrNameLst>
-                                      </p:cBhvr>
-                                      <p:to>
-                                        <p:strVal val="visible"/>
-                                      </p:to>
-                                    </p:set>
-                                  </p:childTnLst>
-                                </p:cTn>
-                              </p:par>
-                            </p:childTnLst>
-                          </p:cTn>
-                        </p:par>
-                      </p:childTnLst>
-                    </p:cTn>
-                  </p:par>
-                  <p:par>
-                    <p:cTn id="7" fill="hold">
-                      <p:stCondLst>
-                        <p:cond delay="indefinite"/>
-                      </p:stCondLst>
-                      <p:childTnLst>
-                        <p:par>
-                          <p:cTn id="8" fill="hold">
-                            <p:stCondLst>
-                              <p:cond delay="0"/>
-                            </p:stCondLst>
-                            <p:childTnLst>
-                              <p:par>
-                                <p:cTn id="9" presetID="1" presetClass="entr" presetSubtype="0" fill="hold" nodeType="clickEffect">
-                                  <p:stCondLst>
-                                    <p:cond delay="0"/>
-                                  </p:stCondLst>
-                                  <p:childTnLst>
-                                    <p:set>
-                                      <p:cBhvr>
-                                        <p:cTn id="10" dur="1" fill="hold">
-                                          <p:stCondLst>
-                                            <p:cond delay="0"/>
-                                          </p:stCondLst>
-                                        </p:cTn>
-                                        <p:tgtEl>
-                                          <p:spTgt spid="22"/>
-                                        </p:tgtEl>
-                                        <p:attrNameLst>
-                                          <p:attrName>style.visibility</p:attrName>
-                                        </p:attrNameLst>
-                                      </p:cBhvr>
-                                      <p:to>
-                                        <p:strVal val="visible"/>
-                                      </p:to>
-                                    </p:set>
-                                  </p:childTnLst>
-                                </p:cTn>
-                              </p:par>
-                            </p:childTnLst>
-                          </p:cTn>
-                        </p:par>
-                      </p:childTnLst>
-                    </p:cTn>
-                  </p:par>
-                  <p:par>
-                    <p:cTn id="11" fill="hold">
-                      <p:stCondLst>
-                        <p:cond delay="indefinite"/>
-                      </p:stCondLst>
-                      <p:childTnLst>
-                        <p:par>
-                          <p:cTn id="12" fill="hold">
-                            <p:stCondLst>
-                              <p:cond delay="0"/>
-                            </p:stCondLst>
-                            <p:childTnLst>
-                              <p:par>
-                                <p:cTn id="13" presetID="1" presetClass="entr" presetSubtype="0" fill="hold" nodeType="clickEffect">
-                                  <p:stCondLst>
-                                    <p:cond delay="0"/>
-                                  </p:stCondLst>
-                                  <p:childTnLst>
-                                    <p:set>
-                                      <p:cBhvr>
-                                        <p:cTn id="14" dur="1" fill="hold">
-                                          <p:stCondLst>
-                                            <p:cond delay="0"/>
-                                          </p:stCondLst>
-                                        </p:cTn>
-                                        <p:tgtEl>
-                                          <p:spTgt spid="29"/>
-                                        </p:tgtEl>
-                                        <p:attrNameLst>
-                                          <p:attrName>style.visibility</p:attrName>
-                                        </p:attrNameLst>
-                                      </p:cBhvr>
-                                      <p:to>
-                                        <p:strVal val="visible"/>
-                                      </p:to>
-                                    </p:set>
-                                  </p:childTnLst>
-                                </p:cTn>
-                              </p:par>
-                            </p:childTnLst>
-                          </p:cTn>
-                        </p:par>
-                      </p:childTnLst>
-                    </p:cTn>
-                  </p:par>
-                  <p:par>
-                    <p:cTn id="15" fill="hold">
-                      <p:stCondLst>
-                        <p:cond delay="indefinite"/>
-                      </p:stCondLst>
-                      <p:childTnLst>
-                        <p:par>
-                          <p:cTn id="16" fill="hold">
-                            <p:stCondLst>
-                              <p:cond delay="0"/>
-                            </p:stCondLst>
-                            <p:childTnLst>
-                              <p:par>
-                                <p:cTn id="17" presetID="1" presetClass="entr" presetSubtype="0" fill="hold" nodeType="clickEffect">
-                                  <p:stCondLst>
-                                    <p:cond delay="0"/>
-                                  </p:stCondLst>
-                                  <p:childTnLst>
-                                    <p:set>
-                                      <p:cBhvr>
-                                        <p:cTn id="18" dur="1" fill="hold">
-                                          <p:stCondLst>
-                                            <p:cond delay="0"/>
-                                          </p:stCondLst>
-                                        </p:cTn>
-                                        <p:tgtEl>
-                                          <p:spTgt spid="13"/>
-                                        </p:tgtEl>
-                                        <p:attrNameLst>
-                                          <p:attrName>style.visibility</p:attrName>
-                                        </p:attrNameLst>
-                                      </p:cBhvr>
-                                      <p:to>
-                                        <p:strVal val="visible"/>
-                                      </p:to>
-                                    </p:set>
-                                  </p:childTnLst>
-                                </p:cTn>
-                              </p:par>
-                            </p:childTnLst>
-                          </p:cTn>
-                        </p:par>
-                      </p:childTnLst>
-                    </p:cTn>
-                  </p:par>
-                  <p:par>
-                    <p:cTn id="19" fill="hold">
-                      <p:stCondLst>
-                        <p:cond delay="indefinite"/>
-                      </p:stCondLst>
-                      <p:childTnLst>
-                        <p:par>
-                          <p:cTn id="20" fill="hold">
-                            <p:stCondLst>
-                              <p:cond delay="0"/>
-                            </p:stCondLst>
-                            <p:childTnLst>
-                              <p:par>
-                                <p:cTn id="21" presetID="1" presetClass="entr" presetSubtype="0" fill="hold" nodeType="clickEffect">
-                                  <p:stCondLst>
-                                    <p:cond delay="0"/>
-                                  </p:stCondLst>
-                                  <p:childTnLst>
-                                    <p:set>
-                                      <p:cBhvr>
-                                        <p:cTn id="22" dur="1" fill="hold">
-                                          <p:stCondLst>
-                                            <p:cond delay="0"/>
-                                          </p:stCondLst>
-                                        </p:cTn>
-                                        <p:tgtEl>
-                                          <p:spTgt spid="14"/>
-                                        </p:tgtEl>
-                                        <p:attrNameLst>
-                                          <p:attrName>style.visibility</p:attrName>
-                                        </p:attrNameLst>
-                                      </p:cBhvr>
-                                      <p:to>
-                                        <p:strVal val="visible"/>
-                                      </p:to>
-                                    </p:set>
-                                  </p:childTnLst>
-                                </p:cTn>
-                              </p:par>
-                            </p:childTnLst>
-                          </p:cTn>
-                        </p:par>
-                      </p:childTnLst>
-                    </p:cTn>
-                  </p:par>
-                </p:childTnLst>
-              </p:cTn>
-              <p:prevCondLst>
-                <p:cond evt="onPrev" delay="0">
-                  <p:tgtEl>
-                    <p:sldTgt/>
-                  </p:tgtEl>
-                </p:cond>
-              </p:prevCondLst>
-              <p:nextCondLst>
-                <p:cond evt="onNext" delay="0">
-                  <p:tgtEl>
-                    <p:sldTgt/>
-                  </p:tgtEl>
-                </p:cond>
-              </p:nextCondLst>
-            </p:seq>
-          </p:childTnLst>
-        </p:cTn>
-      </p:par>
-    </p:tnLst>
-  </p:timing>
 </p:sld>
 </file>
 
@@ -20941,7 +19933,7 @@
     </p:spTree>
     <p:extLst>
       <p:ext uri="{BB962C8B-B14F-4D97-AF65-F5344CB8AC3E}">
-        <p14:creationId xmlns:p14="http://schemas.microsoft.com/office/powerpoint/2010/main" val="818808910"/>
+        <p14:creationId xmlns:p14="http://schemas.microsoft.com/office/powerpoint/2010/main" val="1125864078"/>
       </p:ext>
     </p:extLst>
   </p:cSld>
@@ -21835,6 +20827,1277 @@
   <p:clrMapOvr>
     <a:masterClrMapping/>
   </p:clrMapOvr>
+</p:sld>
+</file>
+
+<file path=ppt/slides/slide28.xml><?xml version="1.0" encoding="utf-8"?>
+<p:sld xmlns:a="http://schemas.openxmlformats.org/drawingml/2006/main" xmlns:r="http://schemas.openxmlformats.org/officeDocument/2006/relationships" xmlns:p="http://schemas.openxmlformats.org/presentationml/2006/main">
+  <p:cSld>
+    <p:spTree>
+      <p:nvGrpSpPr>
+        <p:cNvPr id="1" name=""/>
+        <p:cNvGrpSpPr/>
+        <p:nvPr/>
+      </p:nvGrpSpPr>
+      <p:grpSpPr>
+        <a:xfrm>
+          <a:off x="0" y="0"/>
+          <a:ext cx="0" cy="0"/>
+          <a:chOff x="0" y="0"/>
+          <a:chExt cx="0" cy="0"/>
+        </a:xfrm>
+      </p:grpSpPr>
+      <p:grpSp>
+        <p:nvGrpSpPr>
+          <p:cNvPr id="29" name="Groupe 28">
+            <a:extLst>
+              <a:ext uri="{FF2B5EF4-FFF2-40B4-BE49-F238E27FC236}">
+                <a16:creationId xmlns:a16="http://schemas.microsoft.com/office/drawing/2014/main" id="{EBDE3D9D-3C7D-DA7F-4183-D7F28460DD04}"/>
+              </a:ext>
+            </a:extLst>
+          </p:cNvPr>
+          <p:cNvGrpSpPr/>
+          <p:nvPr/>
+        </p:nvGrpSpPr>
+        <p:grpSpPr>
+          <a:xfrm>
+            <a:off x="1022542" y="1867865"/>
+            <a:ext cx="7011400" cy="1561135"/>
+            <a:chOff x="1022542" y="1867865"/>
+            <a:chExt cx="7011400" cy="1561135"/>
+          </a:xfrm>
+        </p:grpSpPr>
+        <p:sp>
+          <p:nvSpPr>
+            <p:cNvPr id="23" name="Légende : flèche vers la droite 22">
+              <a:extLst>
+                <a:ext uri="{FF2B5EF4-FFF2-40B4-BE49-F238E27FC236}">
+                  <a16:creationId xmlns:a16="http://schemas.microsoft.com/office/drawing/2014/main" id="{AF268228-B638-0700-F8C7-EFE202DB6A89}"/>
+                </a:ext>
+              </a:extLst>
+            </p:cNvPr>
+            <p:cNvSpPr/>
+            <p:nvPr/>
+          </p:nvSpPr>
+          <p:spPr>
+            <a:xfrm>
+              <a:off x="1022542" y="1867865"/>
+              <a:ext cx="4378798" cy="1062527"/>
+            </a:xfrm>
+            <a:prstGeom prst="rightArrowCallout">
+              <a:avLst/>
+            </a:prstGeom>
+            <a:solidFill>
+              <a:schemeClr val="bg1"/>
+            </a:solidFill>
+          </p:spPr>
+          <p:style>
+            <a:lnRef idx="2">
+              <a:schemeClr val="accent1">
+                <a:shade val="50000"/>
+              </a:schemeClr>
+            </a:lnRef>
+            <a:fillRef idx="1">
+              <a:schemeClr val="accent1"/>
+            </a:fillRef>
+            <a:effectRef idx="0">
+              <a:schemeClr val="accent1"/>
+            </a:effectRef>
+            <a:fontRef idx="minor">
+              <a:schemeClr val="lt1"/>
+            </a:fontRef>
+          </p:style>
+          <p:txBody>
+            <a:bodyPr rtlCol="0" anchor="ctr"/>
+            <a:lstStyle/>
+            <a:p>
+              <a:pPr algn="ctr"/>
+              <a:endParaRPr lang="fr-FR"/>
+            </a:p>
+          </p:txBody>
+        </p:sp>
+        <p:grpSp>
+          <p:nvGrpSpPr>
+            <p:cNvPr id="28" name="Groupe 27">
+              <a:extLst>
+                <a:ext uri="{FF2B5EF4-FFF2-40B4-BE49-F238E27FC236}">
+                  <a16:creationId xmlns:a16="http://schemas.microsoft.com/office/drawing/2014/main" id="{63C295B6-CE98-5219-A742-F63BA38A518D}"/>
+                </a:ext>
+              </a:extLst>
+            </p:cNvPr>
+            <p:cNvGrpSpPr/>
+            <p:nvPr/>
+          </p:nvGrpSpPr>
+          <p:grpSpPr>
+            <a:xfrm>
+              <a:off x="5528648" y="2261002"/>
+              <a:ext cx="2505294" cy="1167998"/>
+              <a:chOff x="5528648" y="2261002"/>
+              <a:chExt cx="2505294" cy="1167998"/>
+            </a:xfrm>
+          </p:grpSpPr>
+          <p:sp>
+            <p:nvSpPr>
+              <p:cNvPr id="4" name="ZoneTexte 3">
+                <a:extLst>
+                  <a:ext uri="{FF2B5EF4-FFF2-40B4-BE49-F238E27FC236}">
+                    <a16:creationId xmlns:a16="http://schemas.microsoft.com/office/drawing/2014/main" id="{ACBFB3C2-24E4-1B23-1AB4-B4C8AD4DA46F}"/>
+                  </a:ext>
+                </a:extLst>
+              </p:cNvPr>
+              <p:cNvSpPr txBox="1"/>
+              <p:nvPr/>
+            </p:nvSpPr>
+            <p:spPr>
+              <a:xfrm>
+                <a:off x="5528648" y="2261002"/>
+                <a:ext cx="2505294" cy="282513"/>
+              </a:xfrm>
+              <a:prstGeom prst="rect">
+                <a:avLst/>
+              </a:prstGeom>
+              <a:noFill/>
+            </p:spPr>
+            <p:txBody>
+              <a:bodyPr wrap="square">
+                <a:spAutoFit/>
+              </a:bodyPr>
+              <a:lstStyle/>
+              <a:p>
+                <a:pPr>
+                  <a:lnSpc>
+                    <a:spcPct val="107000"/>
+                  </a:lnSpc>
+                  <a:spcAft>
+                    <a:spcPts val="800"/>
+                  </a:spcAft>
+                </a:pPr>
+                <a:r>
+                  <a:rPr lang="fr-FR" sz="1200" dirty="0">
+                    <a:effectLst/>
+                    <a:latin typeface="Book Antiqua" panose="02040602050305030304" pitchFamily="18" charset="0"/>
+                    <a:ea typeface="Calibri" panose="020F0502020204030204" pitchFamily="34" charset="0"/>
+                    <a:cs typeface="Times New Roman" panose="02020603050405020304" pitchFamily="18" charset="0"/>
+                  </a:rPr>
+                  <a:t>Plans de formation</a:t>
+                </a:r>
+              </a:p>
+            </p:txBody>
+          </p:sp>
+          <p:grpSp>
+            <p:nvGrpSpPr>
+              <p:cNvPr id="27" name="Groupe 26">
+                <a:extLst>
+                  <a:ext uri="{FF2B5EF4-FFF2-40B4-BE49-F238E27FC236}">
+                    <a16:creationId xmlns:a16="http://schemas.microsoft.com/office/drawing/2014/main" id="{C138C3E1-76C7-B5F1-784B-4268394FAA73}"/>
+                  </a:ext>
+                </a:extLst>
+              </p:cNvPr>
+              <p:cNvGrpSpPr/>
+              <p:nvPr/>
+            </p:nvGrpSpPr>
+            <p:grpSpPr>
+              <a:xfrm>
+                <a:off x="5818452" y="2543514"/>
+                <a:ext cx="2079842" cy="885486"/>
+                <a:chOff x="7319531" y="2584526"/>
+                <a:chExt cx="2079842" cy="885486"/>
+              </a:xfrm>
+            </p:grpSpPr>
+            <p:sp>
+              <p:nvSpPr>
+                <p:cNvPr id="26" name="Parchemin : horizontal 25">
+                  <a:extLst>
+                    <a:ext uri="{FF2B5EF4-FFF2-40B4-BE49-F238E27FC236}">
+                      <a16:creationId xmlns:a16="http://schemas.microsoft.com/office/drawing/2014/main" id="{0FCCC1DB-C297-4757-9021-E56779F7B7DC}"/>
+                    </a:ext>
+                  </a:extLst>
+                </p:cNvPr>
+                <p:cNvSpPr/>
+                <p:nvPr/>
+              </p:nvSpPr>
+              <p:spPr>
+                <a:xfrm>
+                  <a:off x="7319531" y="2584526"/>
+                  <a:ext cx="2072753" cy="885486"/>
+                </a:xfrm>
+                <a:prstGeom prst="horizontalScroll">
+                  <a:avLst/>
+                </a:prstGeom>
+                <a:solidFill>
+                  <a:schemeClr val="accent1">
+                    <a:lumMod val="20000"/>
+                    <a:lumOff val="80000"/>
+                  </a:schemeClr>
+                </a:solidFill>
+                <a:ln>
+                  <a:solidFill>
+                    <a:schemeClr val="accent5"/>
+                  </a:solidFill>
+                </a:ln>
+              </p:spPr>
+              <p:style>
+                <a:lnRef idx="2">
+                  <a:schemeClr val="accent1">
+                    <a:shade val="50000"/>
+                  </a:schemeClr>
+                </a:lnRef>
+                <a:fillRef idx="1">
+                  <a:schemeClr val="accent1"/>
+                </a:fillRef>
+                <a:effectRef idx="0">
+                  <a:schemeClr val="accent1"/>
+                </a:effectRef>
+                <a:fontRef idx="minor">
+                  <a:schemeClr val="lt1"/>
+                </a:fontRef>
+              </p:style>
+              <p:txBody>
+                <a:bodyPr rtlCol="0" anchor="ctr"/>
+                <a:lstStyle/>
+                <a:p>
+                  <a:pPr algn="ctr"/>
+                  <a:endParaRPr lang="fr-FR"/>
+                </a:p>
+              </p:txBody>
+            </p:sp>
+            <p:sp>
+              <p:nvSpPr>
+                <p:cNvPr id="3" name="ZoneTexte 2">
+                  <a:extLst>
+                    <a:ext uri="{FF2B5EF4-FFF2-40B4-BE49-F238E27FC236}">
+                      <a16:creationId xmlns:a16="http://schemas.microsoft.com/office/drawing/2014/main" id="{39E74EE8-C0A2-9442-6AC0-6F88A2FD11E3}"/>
+                    </a:ext>
+                  </a:extLst>
+                </p:cNvPr>
+                <p:cNvSpPr txBox="1"/>
+                <p:nvPr/>
+              </p:nvSpPr>
+              <p:spPr>
+                <a:xfrm>
+                  <a:off x="7439996" y="2858596"/>
+                  <a:ext cx="1959377" cy="376385"/>
+                </a:xfrm>
+                <a:prstGeom prst="rect">
+                  <a:avLst/>
+                </a:prstGeom>
+                <a:noFill/>
+              </p:spPr>
+              <p:txBody>
+                <a:bodyPr wrap="square">
+                  <a:spAutoFit/>
+                </a:bodyPr>
+                <a:lstStyle/>
+                <a:p>
+                  <a:pPr>
+                    <a:lnSpc>
+                      <a:spcPct val="107000"/>
+                    </a:lnSpc>
+                    <a:spcAft>
+                      <a:spcPts val="800"/>
+                    </a:spcAft>
+                  </a:pPr>
+                  <a:r>
+                    <a:rPr lang="fr-FR" b="1" dirty="0">
+                      <a:solidFill>
+                        <a:schemeClr val="accent1">
+                          <a:lumMod val="50000"/>
+                        </a:schemeClr>
+                      </a:solidFill>
+                      <a:effectLst/>
+                      <a:latin typeface="Book Antiqua" panose="02040602050305030304" pitchFamily="18" charset="0"/>
+                      <a:ea typeface="Calibri" panose="020F0502020204030204" pitchFamily="34" charset="0"/>
+                      <a:cs typeface="Times New Roman" panose="02020603050405020304" pitchFamily="18" charset="0"/>
+                    </a:rPr>
+                    <a:t>RESKILLING !!!</a:t>
+                  </a:r>
+                </a:p>
+              </p:txBody>
+            </p:sp>
+          </p:grpSp>
+        </p:grpSp>
+      </p:grpSp>
+      <p:sp>
+        <p:nvSpPr>
+          <p:cNvPr id="2" name="Titre 1">
+            <a:extLst>
+              <a:ext uri="{FF2B5EF4-FFF2-40B4-BE49-F238E27FC236}">
+                <a16:creationId xmlns:a16="http://schemas.microsoft.com/office/drawing/2014/main" id="{099E2E77-954A-DD7C-99BF-B9521D1A2115}"/>
+              </a:ext>
+            </a:extLst>
+          </p:cNvPr>
+          <p:cNvSpPr>
+            <a:spLocks noGrp="1"/>
+          </p:cNvSpPr>
+          <p:nvPr>
+            <p:ph type="title"/>
+          </p:nvPr>
+        </p:nvSpPr>
+        <p:spPr>
+          <a:xfrm>
+            <a:off x="912628" y="1055531"/>
+            <a:ext cx="10515600" cy="677750"/>
+          </a:xfrm>
+        </p:spPr>
+        <p:txBody>
+          <a:bodyPr>
+            <a:normAutofit/>
+          </a:bodyPr>
+          <a:lstStyle/>
+          <a:p>
+            <a:r>
+              <a:rPr lang="fr-FR" sz="3200" dirty="0"/>
+              <a:t>Contexte Société Générale</a:t>
+            </a:r>
+          </a:p>
+        </p:txBody>
+      </p:sp>
+      <p:pic>
+        <p:nvPicPr>
+          <p:cNvPr id="7" name="Espace réservé du contenu 6" descr="Une image contenant flèche&#10;&#10;Description générée automatiquement">
+            <a:extLst>
+              <a:ext uri="{FF2B5EF4-FFF2-40B4-BE49-F238E27FC236}">
+                <a16:creationId xmlns:a16="http://schemas.microsoft.com/office/drawing/2014/main" id="{520C8AB2-C7FA-4E85-F4DE-20ECC580ACB0}"/>
+              </a:ext>
+            </a:extLst>
+          </p:cNvPr>
+          <p:cNvPicPr>
+            <a:picLocks noGrp="1" noChangeAspect="1"/>
+          </p:cNvPicPr>
+          <p:nvPr>
+            <p:ph idx="1"/>
+          </p:nvPr>
+        </p:nvPicPr>
+        <p:blipFill>
+          <a:blip r:embed="rId2">
+            <a:extLst>
+              <a:ext uri="{28A0092B-C50C-407E-A947-70E740481C1C}">
+                <a14:useLocalDpi xmlns:a14="http://schemas.microsoft.com/office/drawing/2010/main" val="0"/>
+              </a:ext>
+            </a:extLst>
+          </a:blip>
+          <a:stretch>
+            <a:fillRect/>
+          </a:stretch>
+        </p:blipFill>
+        <p:spPr>
+          <a:xfrm>
+            <a:off x="8651561" y="681038"/>
+            <a:ext cx="1186827" cy="1186827"/>
+          </a:xfrm>
+        </p:spPr>
+      </p:pic>
+      <p:grpSp>
+        <p:nvGrpSpPr>
+          <p:cNvPr id="13" name="Groupe 12">
+            <a:extLst>
+              <a:ext uri="{FF2B5EF4-FFF2-40B4-BE49-F238E27FC236}">
+                <a16:creationId xmlns:a16="http://schemas.microsoft.com/office/drawing/2014/main" id="{8FE30EE8-9561-2EF7-8767-44261BF496DE}"/>
+              </a:ext>
+            </a:extLst>
+          </p:cNvPr>
+          <p:cNvGrpSpPr/>
+          <p:nvPr/>
+        </p:nvGrpSpPr>
+        <p:grpSpPr>
+          <a:xfrm>
+            <a:off x="1641485" y="3936395"/>
+            <a:ext cx="3331672" cy="1651149"/>
+            <a:chOff x="2018416" y="2563628"/>
+            <a:chExt cx="7920410" cy="1651149"/>
+          </a:xfrm>
+        </p:grpSpPr>
+        <p:sp>
+          <p:nvSpPr>
+            <p:cNvPr id="6" name="ZoneTexte 5">
+              <a:extLst>
+                <a:ext uri="{FF2B5EF4-FFF2-40B4-BE49-F238E27FC236}">
+                  <a16:creationId xmlns:a16="http://schemas.microsoft.com/office/drawing/2014/main" id="{14A758CC-D953-92A8-7091-B2C502398684}"/>
+                </a:ext>
+              </a:extLst>
+            </p:cNvPr>
+            <p:cNvSpPr txBox="1"/>
+            <p:nvPr/>
+          </p:nvSpPr>
+          <p:spPr>
+            <a:xfrm>
+              <a:off x="2267281" y="3031633"/>
+              <a:ext cx="7263076" cy="1183144"/>
+            </a:xfrm>
+            <a:prstGeom prst="rect">
+              <a:avLst/>
+            </a:prstGeom>
+            <a:noFill/>
+          </p:spPr>
+          <p:txBody>
+            <a:bodyPr wrap="square">
+              <a:spAutoFit/>
+            </a:bodyPr>
+            <a:lstStyle/>
+            <a:p>
+              <a:pPr marL="228600" indent="-228600">
+                <a:lnSpc>
+                  <a:spcPct val="107000"/>
+                </a:lnSpc>
+                <a:spcAft>
+                  <a:spcPts val="800"/>
+                </a:spcAft>
+                <a:buFont typeface="Wingdings" panose="05000000000000000000" pitchFamily="2" charset="2"/>
+                <a:buChar char="q"/>
+              </a:pPr>
+              <a:r>
+                <a:rPr lang="fr-FR" sz="1200" dirty="0">
+                  <a:latin typeface="Book Antiqua" panose="02040602050305030304" pitchFamily="18" charset="0"/>
+                  <a:ea typeface="Calibri" panose="020F0502020204030204" pitchFamily="34" charset="0"/>
+                  <a:cs typeface="Times New Roman" panose="02020603050405020304" pitchFamily="18" charset="0"/>
+                </a:rPr>
+                <a:t>Support</a:t>
+              </a:r>
+            </a:p>
+            <a:p>
+              <a:pPr marL="228600" indent="-228600">
+                <a:lnSpc>
+                  <a:spcPct val="107000"/>
+                </a:lnSpc>
+                <a:spcAft>
+                  <a:spcPts val="800"/>
+                </a:spcAft>
+                <a:buFont typeface="Wingdings" panose="05000000000000000000" pitchFamily="2" charset="2"/>
+                <a:buChar char="q"/>
+              </a:pPr>
+              <a:r>
+                <a:rPr lang="fr-FR" sz="1200" dirty="0">
+                  <a:latin typeface="Book Antiqua" panose="02040602050305030304" pitchFamily="18" charset="0"/>
+                  <a:ea typeface="Calibri" panose="020F0502020204030204" pitchFamily="34" charset="0"/>
+                  <a:cs typeface="Times New Roman" panose="02020603050405020304" pitchFamily="18" charset="0"/>
+                </a:rPr>
+                <a:t>Maintenance</a:t>
+              </a:r>
+            </a:p>
+            <a:p>
+              <a:pPr marL="228600" indent="-228600">
+                <a:lnSpc>
+                  <a:spcPct val="107000"/>
+                </a:lnSpc>
+                <a:spcAft>
+                  <a:spcPts val="800"/>
+                </a:spcAft>
+                <a:buFont typeface="Wingdings" panose="05000000000000000000" pitchFamily="2" charset="2"/>
+                <a:buChar char="q"/>
+              </a:pPr>
+              <a:r>
+                <a:rPr lang="fr-FR" sz="1200" dirty="0">
+                  <a:latin typeface="Book Antiqua" panose="02040602050305030304" pitchFamily="18" charset="0"/>
+                  <a:ea typeface="Calibri" panose="020F0502020204030204" pitchFamily="34" charset="0"/>
+                  <a:cs typeface="Times New Roman" panose="02020603050405020304" pitchFamily="18" charset="0"/>
+                </a:rPr>
+                <a:t>Développement</a:t>
+              </a:r>
+            </a:p>
+            <a:p>
+              <a:pPr marL="228600" indent="-228600">
+                <a:lnSpc>
+                  <a:spcPct val="107000"/>
+                </a:lnSpc>
+                <a:spcAft>
+                  <a:spcPts val="800"/>
+                </a:spcAft>
+                <a:buFont typeface="Wingdings" panose="05000000000000000000" pitchFamily="2" charset="2"/>
+                <a:buChar char="q"/>
+              </a:pPr>
+              <a:r>
+                <a:rPr lang="fr-FR" sz="1200" dirty="0">
+                  <a:latin typeface="Book Antiqua" panose="02040602050305030304" pitchFamily="18" charset="0"/>
+                  <a:ea typeface="Calibri" panose="020F0502020204030204" pitchFamily="34" charset="0"/>
+                  <a:cs typeface="Times New Roman" panose="02020603050405020304" pitchFamily="18" charset="0"/>
+                </a:rPr>
+                <a:t>Tests de non régression</a:t>
+              </a:r>
+            </a:p>
+          </p:txBody>
+        </p:sp>
+        <p:sp>
+          <p:nvSpPr>
+            <p:cNvPr id="8" name="Titre 1">
+              <a:extLst>
+                <a:ext uri="{FF2B5EF4-FFF2-40B4-BE49-F238E27FC236}">
+                  <a16:creationId xmlns:a16="http://schemas.microsoft.com/office/drawing/2014/main" id="{472F6CE5-DE74-A322-A738-C53D7DBFF9E6}"/>
+                </a:ext>
+              </a:extLst>
+            </p:cNvPr>
+            <p:cNvSpPr txBox="1">
+              <a:spLocks/>
+            </p:cNvSpPr>
+            <p:nvPr/>
+          </p:nvSpPr>
+          <p:spPr>
+            <a:xfrm>
+              <a:off x="2018416" y="2563628"/>
+              <a:ext cx="7920410" cy="547115"/>
+            </a:xfrm>
+            <a:prstGeom prst="rect">
+              <a:avLst/>
+            </a:prstGeom>
+          </p:spPr>
+          <p:txBody>
+            <a:bodyPr vert="horz" lIns="91440" tIns="45720" rIns="91440" bIns="45720" rtlCol="0" anchor="ctr">
+              <a:normAutofit fontScale="70000" lnSpcReduction="20000"/>
+            </a:bodyPr>
+            <a:lstStyle>
+              <a:lvl1pPr marL="0" algn="l" defTabSz="914400" rtl="0" eaLnBrk="1" latinLnBrk="0" hangingPunct="1">
+                <a:lnSpc>
+                  <a:spcPct val="90000"/>
+                </a:lnSpc>
+                <a:spcBef>
+                  <a:spcPct val="0"/>
+                </a:spcBef>
+                <a:buNone/>
+                <a:defRPr lang="en-US" sz="5200" kern="1200" dirty="0">
+                  <a:gradFill flip="none" rotWithShape="1">
+                    <a:gsLst>
+                      <a:gs pos="0">
+                        <a:schemeClr val="accent5"/>
+                      </a:gs>
+                      <a:gs pos="100000">
+                        <a:schemeClr val="accent1">
+                          <a:alpha val="70000"/>
+                        </a:schemeClr>
+                      </a:gs>
+                    </a:gsLst>
+                    <a:lin ang="0" scaled="1"/>
+                    <a:tileRect/>
+                  </a:gradFill>
+                  <a:latin typeface="+mj-lt"/>
+                  <a:ea typeface="+mn-ea"/>
+                  <a:cs typeface="Angsana New" panose="02020603050405020304" pitchFamily="18" charset="-34"/>
+                </a:defRPr>
+              </a:lvl1pPr>
+            </a:lstStyle>
+            <a:p>
+              <a:r>
+                <a:rPr lang="fr-FR" sz="2800" dirty="0" err="1"/>
+                <a:t>Xone</a:t>
+              </a:r>
+              <a:r>
+                <a:rPr lang="fr-FR" sz="2800" dirty="0"/>
+                <a:t> : SI gestion transactions banque d’investissements</a:t>
+              </a:r>
+            </a:p>
+          </p:txBody>
+        </p:sp>
+      </p:grpSp>
+      <p:grpSp>
+        <p:nvGrpSpPr>
+          <p:cNvPr id="14" name="Groupe 13">
+            <a:extLst>
+              <a:ext uri="{FF2B5EF4-FFF2-40B4-BE49-F238E27FC236}">
+                <a16:creationId xmlns:a16="http://schemas.microsoft.com/office/drawing/2014/main" id="{BEC458D6-1D51-F331-1ED9-1E0518CD31F9}"/>
+              </a:ext>
+            </a:extLst>
+          </p:cNvPr>
+          <p:cNvGrpSpPr/>
+          <p:nvPr/>
+        </p:nvGrpSpPr>
+        <p:grpSpPr>
+          <a:xfrm>
+            <a:off x="5938917" y="4354684"/>
+            <a:ext cx="3354499" cy="1435824"/>
+            <a:chOff x="3494165" y="4326196"/>
+            <a:chExt cx="3407656" cy="1435824"/>
+          </a:xfrm>
+        </p:grpSpPr>
+        <p:sp>
+          <p:nvSpPr>
+            <p:cNvPr id="11" name="Titre 1">
+              <a:extLst>
+                <a:ext uri="{FF2B5EF4-FFF2-40B4-BE49-F238E27FC236}">
+                  <a16:creationId xmlns:a16="http://schemas.microsoft.com/office/drawing/2014/main" id="{2A0F28B1-E086-F076-13D2-63284AC23C49}"/>
+                </a:ext>
+              </a:extLst>
+            </p:cNvPr>
+            <p:cNvSpPr txBox="1">
+              <a:spLocks/>
+            </p:cNvSpPr>
+            <p:nvPr/>
+          </p:nvSpPr>
+          <p:spPr>
+            <a:xfrm>
+              <a:off x="3494165" y="4326196"/>
+              <a:ext cx="3172106" cy="550333"/>
+            </a:xfrm>
+            <a:prstGeom prst="rect">
+              <a:avLst/>
+            </a:prstGeom>
+          </p:spPr>
+          <p:txBody>
+            <a:bodyPr vert="horz" lIns="91440" tIns="45720" rIns="91440" bIns="45720" rtlCol="0" anchor="ctr">
+              <a:noAutofit/>
+            </a:bodyPr>
+            <a:lstStyle>
+              <a:lvl1pPr marL="0" algn="l" defTabSz="914400" rtl="0" eaLnBrk="1" latinLnBrk="0" hangingPunct="1">
+                <a:lnSpc>
+                  <a:spcPct val="90000"/>
+                </a:lnSpc>
+                <a:spcBef>
+                  <a:spcPct val="0"/>
+                </a:spcBef>
+                <a:buNone/>
+                <a:defRPr lang="en-US" sz="5200" kern="1200" dirty="0">
+                  <a:gradFill flip="none" rotWithShape="1">
+                    <a:gsLst>
+                      <a:gs pos="0">
+                        <a:schemeClr val="accent5"/>
+                      </a:gs>
+                      <a:gs pos="100000">
+                        <a:schemeClr val="accent1">
+                          <a:alpha val="70000"/>
+                        </a:schemeClr>
+                      </a:gs>
+                    </a:gsLst>
+                    <a:lin ang="0" scaled="1"/>
+                    <a:tileRect/>
+                  </a:gradFill>
+                  <a:latin typeface="+mj-lt"/>
+                  <a:ea typeface="+mn-ea"/>
+                  <a:cs typeface="Angsana New" panose="02020603050405020304" pitchFamily="18" charset="-34"/>
+                </a:defRPr>
+              </a:lvl1pPr>
+            </a:lstStyle>
+            <a:p>
+              <a:r>
+                <a:rPr lang="fr-FR" sz="2000" dirty="0"/>
+                <a:t>Et moi dans tout ça…</a:t>
+              </a:r>
+            </a:p>
+          </p:txBody>
+        </p:sp>
+        <p:sp>
+          <p:nvSpPr>
+            <p:cNvPr id="12" name="ZoneTexte 11">
+              <a:extLst>
+                <a:ext uri="{FF2B5EF4-FFF2-40B4-BE49-F238E27FC236}">
+                  <a16:creationId xmlns:a16="http://schemas.microsoft.com/office/drawing/2014/main" id="{FEE3E477-56C2-2997-D394-91FD365149F5}"/>
+                </a:ext>
+              </a:extLst>
+            </p:cNvPr>
+            <p:cNvSpPr txBox="1"/>
+            <p:nvPr/>
+          </p:nvSpPr>
+          <p:spPr>
+            <a:xfrm>
+              <a:off x="3729715" y="4879086"/>
+              <a:ext cx="3172106" cy="882934"/>
+            </a:xfrm>
+            <a:prstGeom prst="rect">
+              <a:avLst/>
+            </a:prstGeom>
+            <a:noFill/>
+          </p:spPr>
+          <p:txBody>
+            <a:bodyPr wrap="square">
+              <a:spAutoFit/>
+            </a:bodyPr>
+            <a:lstStyle/>
+            <a:p>
+              <a:pPr marL="285750" indent="-285750">
+                <a:lnSpc>
+                  <a:spcPct val="107000"/>
+                </a:lnSpc>
+                <a:spcAft>
+                  <a:spcPts val="800"/>
+                </a:spcAft>
+                <a:buFont typeface="Wingdings" panose="05000000000000000000" pitchFamily="2" charset="2"/>
+                <a:buChar char="q"/>
+              </a:pPr>
+              <a:r>
+                <a:rPr lang="fr-FR" sz="1200" dirty="0" err="1">
+                  <a:latin typeface="Book Antiqua" panose="02040602050305030304" pitchFamily="18" charset="0"/>
+                  <a:ea typeface="Calibri" panose="020F0502020204030204" pitchFamily="34" charset="0"/>
+                  <a:cs typeface="Times New Roman" panose="02020603050405020304" pitchFamily="18" charset="0"/>
+                </a:rPr>
+                <a:t>Reskilling</a:t>
+              </a:r>
+              <a:r>
+                <a:rPr lang="fr-FR" sz="1200" dirty="0">
+                  <a:latin typeface="Book Antiqua" panose="02040602050305030304" pitchFamily="18" charset="0"/>
+                  <a:ea typeface="Calibri" panose="020F0502020204030204" pitchFamily="34" charset="0"/>
+                  <a:cs typeface="Times New Roman" panose="02020603050405020304" pitchFamily="18" charset="0"/>
+                </a:rPr>
+                <a:t> pour changer de carrière</a:t>
+              </a:r>
+            </a:p>
+            <a:p>
+              <a:pPr marL="285750" indent="-285750">
+                <a:lnSpc>
+                  <a:spcPct val="107000"/>
+                </a:lnSpc>
+                <a:spcAft>
+                  <a:spcPts val="800"/>
+                </a:spcAft>
+                <a:buFont typeface="Wingdings" panose="05000000000000000000" pitchFamily="2" charset="2"/>
+                <a:buChar char="q"/>
+              </a:pPr>
+              <a:r>
+                <a:rPr lang="fr-FR" sz="1200" dirty="0">
+                  <a:latin typeface="Book Antiqua" panose="02040602050305030304" pitchFamily="18" charset="0"/>
+                  <a:ea typeface="Calibri" panose="020F0502020204030204" pitchFamily="34" charset="0"/>
+                  <a:cs typeface="Times New Roman" panose="02020603050405020304" pitchFamily="18" charset="0"/>
+                </a:rPr>
+                <a:t>Développement</a:t>
+              </a:r>
+            </a:p>
+            <a:p>
+              <a:pPr marL="285750" indent="-285750">
+                <a:lnSpc>
+                  <a:spcPct val="107000"/>
+                </a:lnSpc>
+                <a:spcAft>
+                  <a:spcPts val="800"/>
+                </a:spcAft>
+                <a:buFont typeface="Wingdings" panose="05000000000000000000" pitchFamily="2" charset="2"/>
+                <a:buChar char="q"/>
+              </a:pPr>
+              <a:r>
+                <a:rPr lang="fr-FR" sz="1200" dirty="0">
+                  <a:latin typeface="Book Antiqua" panose="02040602050305030304" pitchFamily="18" charset="0"/>
+                  <a:ea typeface="Calibri" panose="020F0502020204030204" pitchFamily="34" charset="0"/>
+                  <a:cs typeface="Times New Roman" panose="02020603050405020304" pitchFamily="18" charset="0"/>
+                </a:rPr>
+                <a:t>Tests</a:t>
+              </a:r>
+            </a:p>
+          </p:txBody>
+        </p:sp>
+      </p:grpSp>
+      <p:grpSp>
+        <p:nvGrpSpPr>
+          <p:cNvPr id="21" name="Groupe 20">
+            <a:extLst>
+              <a:ext uri="{FF2B5EF4-FFF2-40B4-BE49-F238E27FC236}">
+                <a16:creationId xmlns:a16="http://schemas.microsoft.com/office/drawing/2014/main" id="{92EAA6D7-56A5-5270-EA19-981AC0441369}"/>
+              </a:ext>
+            </a:extLst>
+          </p:cNvPr>
+          <p:cNvGrpSpPr/>
+          <p:nvPr/>
+        </p:nvGrpSpPr>
+        <p:grpSpPr>
+          <a:xfrm>
+            <a:off x="1110107" y="1933295"/>
+            <a:ext cx="2594395" cy="535981"/>
+            <a:chOff x="1148177" y="1711362"/>
+            <a:chExt cx="2594395" cy="535981"/>
+          </a:xfrm>
+        </p:grpSpPr>
+        <p:sp>
+          <p:nvSpPr>
+            <p:cNvPr id="9" name="ZoneTexte 8">
+              <a:extLst>
+                <a:ext uri="{FF2B5EF4-FFF2-40B4-BE49-F238E27FC236}">
+                  <a16:creationId xmlns:a16="http://schemas.microsoft.com/office/drawing/2014/main" id="{BC23ED4F-C6A3-6A63-6E53-A21EC4FABCD5}"/>
+                </a:ext>
+              </a:extLst>
+            </p:cNvPr>
+            <p:cNvSpPr txBox="1"/>
+            <p:nvPr/>
+          </p:nvSpPr>
+          <p:spPr>
+            <a:xfrm>
+              <a:off x="1148177" y="1805908"/>
+              <a:ext cx="2594395" cy="282321"/>
+            </a:xfrm>
+            <a:prstGeom prst="rect">
+              <a:avLst/>
+            </a:prstGeom>
+            <a:noFill/>
+          </p:spPr>
+          <p:txBody>
+            <a:bodyPr wrap="square">
+              <a:spAutoFit/>
+            </a:bodyPr>
+            <a:lstStyle/>
+            <a:p>
+              <a:pPr>
+                <a:lnSpc>
+                  <a:spcPct val="107000"/>
+                </a:lnSpc>
+                <a:spcAft>
+                  <a:spcPts val="800"/>
+                </a:spcAft>
+              </a:pPr>
+              <a:r>
+                <a:rPr lang="fr-FR" sz="1200" dirty="0">
+                  <a:effectLst/>
+                  <a:latin typeface="Book Antiqua" panose="02040602050305030304" pitchFamily="18" charset="0"/>
+                  <a:ea typeface="Calibri" panose="020F0502020204030204" pitchFamily="34" charset="0"/>
+                  <a:cs typeface="Times New Roman" panose="02020603050405020304" pitchFamily="18" charset="0"/>
+                </a:rPr>
+                <a:t>Besoin en informatiques</a:t>
+              </a:r>
+              <a:endParaRPr lang="fr-FR" sz="2800" b="1" dirty="0">
+                <a:solidFill>
+                  <a:schemeClr val="accent6">
+                    <a:lumMod val="75000"/>
+                  </a:schemeClr>
+                </a:solidFill>
+                <a:effectLst/>
+                <a:latin typeface="Book Antiqua" panose="02040602050305030304" pitchFamily="18" charset="0"/>
+                <a:ea typeface="Calibri" panose="020F0502020204030204" pitchFamily="34" charset="0"/>
+                <a:cs typeface="Times New Roman" panose="02020603050405020304" pitchFamily="18" charset="0"/>
+              </a:endParaRPr>
+            </a:p>
+          </p:txBody>
+        </p:sp>
+        <p:sp>
+          <p:nvSpPr>
+            <p:cNvPr id="18" name="ZoneTexte 17">
+              <a:extLst>
+                <a:ext uri="{FF2B5EF4-FFF2-40B4-BE49-F238E27FC236}">
+                  <a16:creationId xmlns:a16="http://schemas.microsoft.com/office/drawing/2014/main" id="{118B1DFB-43CD-2307-85EC-71817F8A30A1}"/>
+                </a:ext>
+              </a:extLst>
+            </p:cNvPr>
+            <p:cNvSpPr txBox="1"/>
+            <p:nvPr/>
+          </p:nvSpPr>
+          <p:spPr>
+            <a:xfrm>
+              <a:off x="2871872" y="1711362"/>
+              <a:ext cx="870700" cy="535981"/>
+            </a:xfrm>
+            <a:prstGeom prst="rect">
+              <a:avLst/>
+            </a:prstGeom>
+            <a:noFill/>
+          </p:spPr>
+          <p:txBody>
+            <a:bodyPr wrap="square">
+              <a:spAutoFit/>
+            </a:bodyPr>
+            <a:lstStyle/>
+            <a:p>
+              <a:pPr>
+                <a:lnSpc>
+                  <a:spcPct val="107000"/>
+                </a:lnSpc>
+                <a:spcAft>
+                  <a:spcPts val="800"/>
+                </a:spcAft>
+              </a:pPr>
+              <a:r>
+                <a:rPr lang="fr-FR" sz="2800" b="1" dirty="0">
+                  <a:solidFill>
+                    <a:schemeClr val="accent6">
+                      <a:lumMod val="75000"/>
+                    </a:schemeClr>
+                  </a:solidFill>
+                  <a:effectLst/>
+                  <a:latin typeface="Book Antiqua" panose="02040602050305030304" pitchFamily="18" charset="0"/>
+                  <a:ea typeface="Calibri" panose="020F0502020204030204" pitchFamily="34" charset="0"/>
+                  <a:cs typeface="Times New Roman" panose="02020603050405020304" pitchFamily="18" charset="0"/>
+                </a:rPr>
+                <a:t>+++</a:t>
+              </a:r>
+            </a:p>
+          </p:txBody>
+        </p:sp>
+      </p:grpSp>
+      <p:grpSp>
+        <p:nvGrpSpPr>
+          <p:cNvPr id="22" name="Groupe 21">
+            <a:extLst>
+              <a:ext uri="{FF2B5EF4-FFF2-40B4-BE49-F238E27FC236}">
+                <a16:creationId xmlns:a16="http://schemas.microsoft.com/office/drawing/2014/main" id="{851BF32D-2CBE-14D1-C34E-5E842427B373}"/>
+              </a:ext>
+            </a:extLst>
+          </p:cNvPr>
+          <p:cNvGrpSpPr/>
+          <p:nvPr/>
+        </p:nvGrpSpPr>
+        <p:grpSpPr>
+          <a:xfrm>
+            <a:off x="1383159" y="2282108"/>
+            <a:ext cx="2160392" cy="535981"/>
+            <a:chOff x="1649198" y="2080123"/>
+            <a:chExt cx="2160392" cy="535981"/>
+          </a:xfrm>
+        </p:grpSpPr>
+        <p:sp>
+          <p:nvSpPr>
+            <p:cNvPr id="19" name="ZoneTexte 18">
+              <a:extLst>
+                <a:ext uri="{FF2B5EF4-FFF2-40B4-BE49-F238E27FC236}">
+                  <a16:creationId xmlns:a16="http://schemas.microsoft.com/office/drawing/2014/main" id="{8D9A0323-DC8B-2862-D066-BF4DD1001C57}"/>
+                </a:ext>
+              </a:extLst>
+            </p:cNvPr>
+            <p:cNvSpPr txBox="1"/>
+            <p:nvPr/>
+          </p:nvSpPr>
+          <p:spPr>
+            <a:xfrm>
+              <a:off x="1649198" y="2205159"/>
+              <a:ext cx="2147688" cy="282321"/>
+            </a:xfrm>
+            <a:prstGeom prst="rect">
+              <a:avLst/>
+            </a:prstGeom>
+            <a:noFill/>
+          </p:spPr>
+          <p:txBody>
+            <a:bodyPr wrap="square">
+              <a:spAutoFit/>
+            </a:bodyPr>
+            <a:lstStyle/>
+            <a:p>
+              <a:pPr>
+                <a:lnSpc>
+                  <a:spcPct val="107000"/>
+                </a:lnSpc>
+                <a:spcAft>
+                  <a:spcPts val="800"/>
+                </a:spcAft>
+              </a:pPr>
+              <a:r>
+                <a:rPr lang="fr-FR" sz="1200" dirty="0">
+                  <a:effectLst/>
+                  <a:latin typeface="Book Antiqua" panose="02040602050305030304" pitchFamily="18" charset="0"/>
+                  <a:ea typeface="Calibri" panose="020F0502020204030204" pitchFamily="34" charset="0"/>
+                  <a:cs typeface="Times New Roman" panose="02020603050405020304" pitchFamily="18" charset="0"/>
+                </a:rPr>
+                <a:t>Besoin métiers</a:t>
+              </a:r>
+              <a:endParaRPr lang="fr-FR" sz="2800" b="1" dirty="0">
+                <a:solidFill>
+                  <a:schemeClr val="accent6">
+                    <a:lumMod val="75000"/>
+                  </a:schemeClr>
+                </a:solidFill>
+                <a:effectLst/>
+                <a:latin typeface="Book Antiqua" panose="02040602050305030304" pitchFamily="18" charset="0"/>
+                <a:ea typeface="Calibri" panose="020F0502020204030204" pitchFamily="34" charset="0"/>
+                <a:cs typeface="Times New Roman" panose="02020603050405020304" pitchFamily="18" charset="0"/>
+              </a:endParaRPr>
+            </a:p>
+          </p:txBody>
+        </p:sp>
+        <p:sp>
+          <p:nvSpPr>
+            <p:cNvPr id="20" name="ZoneTexte 19">
+              <a:extLst>
+                <a:ext uri="{FF2B5EF4-FFF2-40B4-BE49-F238E27FC236}">
+                  <a16:creationId xmlns:a16="http://schemas.microsoft.com/office/drawing/2014/main" id="{3F9661F0-037A-81C3-15B8-F95A4D633225}"/>
+                </a:ext>
+              </a:extLst>
+            </p:cNvPr>
+            <p:cNvSpPr txBox="1"/>
+            <p:nvPr/>
+          </p:nvSpPr>
+          <p:spPr>
+            <a:xfrm>
+              <a:off x="2938890" y="2080123"/>
+              <a:ext cx="870700" cy="535981"/>
+            </a:xfrm>
+            <a:prstGeom prst="rect">
+              <a:avLst/>
+            </a:prstGeom>
+            <a:noFill/>
+          </p:spPr>
+          <p:txBody>
+            <a:bodyPr wrap="square">
+              <a:spAutoFit/>
+            </a:bodyPr>
+            <a:lstStyle/>
+            <a:p>
+              <a:pPr>
+                <a:lnSpc>
+                  <a:spcPct val="107000"/>
+                </a:lnSpc>
+                <a:spcAft>
+                  <a:spcPts val="800"/>
+                </a:spcAft>
+              </a:pPr>
+              <a:r>
+                <a:rPr lang="fr-FR" sz="2800" b="1" dirty="0">
+                  <a:solidFill>
+                    <a:srgbClr val="FF0000"/>
+                  </a:solidFill>
+                  <a:effectLst/>
+                  <a:latin typeface="Book Antiqua" panose="02040602050305030304" pitchFamily="18" charset="0"/>
+                  <a:ea typeface="Calibri" panose="020F0502020204030204" pitchFamily="34" charset="0"/>
+                  <a:cs typeface="Times New Roman" panose="02020603050405020304" pitchFamily="18" charset="0"/>
+                </a:rPr>
+                <a:t>- - -</a:t>
+              </a:r>
+            </a:p>
+          </p:txBody>
+        </p:sp>
+      </p:grpSp>
+    </p:spTree>
+    <p:extLst>
+      <p:ext uri="{BB962C8B-B14F-4D97-AF65-F5344CB8AC3E}">
+        <p14:creationId xmlns:p14="http://schemas.microsoft.com/office/powerpoint/2010/main" val="1353371378"/>
+      </p:ext>
+    </p:extLst>
+  </p:cSld>
+  <p:clrMapOvr>
+    <a:masterClrMapping/>
+  </p:clrMapOvr>
+  <p:timing>
+    <p:tnLst>
+      <p:par>
+        <p:cTn id="1" dur="indefinite" restart="never" nodeType="tmRoot">
+          <p:childTnLst>
+            <p:seq concurrent="1" nextAc="seek">
+              <p:cTn id="2" dur="indefinite" nodeType="mainSeq">
+                <p:childTnLst>
+                  <p:par>
+                    <p:cTn id="3" fill="hold">
+                      <p:stCondLst>
+                        <p:cond delay="indefinite"/>
+                      </p:stCondLst>
+                      <p:childTnLst>
+                        <p:par>
+                          <p:cTn id="4" fill="hold">
+                            <p:stCondLst>
+                              <p:cond delay="0"/>
+                            </p:stCondLst>
+                            <p:childTnLst>
+                              <p:par>
+                                <p:cTn id="5" presetID="1" presetClass="entr" presetSubtype="0" fill="hold" nodeType="clickEffect">
+                                  <p:stCondLst>
+                                    <p:cond delay="0"/>
+                                  </p:stCondLst>
+                                  <p:childTnLst>
+                                    <p:set>
+                                      <p:cBhvr>
+                                        <p:cTn id="6" dur="1" fill="hold">
+                                          <p:stCondLst>
+                                            <p:cond delay="0"/>
+                                          </p:stCondLst>
+                                        </p:cTn>
+                                        <p:tgtEl>
+                                          <p:spTgt spid="21"/>
+                                        </p:tgtEl>
+                                        <p:attrNameLst>
+                                          <p:attrName>style.visibility</p:attrName>
+                                        </p:attrNameLst>
+                                      </p:cBhvr>
+                                      <p:to>
+                                        <p:strVal val="visible"/>
+                                      </p:to>
+                                    </p:set>
+                                  </p:childTnLst>
+                                </p:cTn>
+                              </p:par>
+                            </p:childTnLst>
+                          </p:cTn>
+                        </p:par>
+                      </p:childTnLst>
+                    </p:cTn>
+                  </p:par>
+                  <p:par>
+                    <p:cTn id="7" fill="hold">
+                      <p:stCondLst>
+                        <p:cond delay="indefinite"/>
+                      </p:stCondLst>
+                      <p:childTnLst>
+                        <p:par>
+                          <p:cTn id="8" fill="hold">
+                            <p:stCondLst>
+                              <p:cond delay="0"/>
+                            </p:stCondLst>
+                            <p:childTnLst>
+                              <p:par>
+                                <p:cTn id="9" presetID="1" presetClass="entr" presetSubtype="0" fill="hold" nodeType="clickEffect">
+                                  <p:stCondLst>
+                                    <p:cond delay="0"/>
+                                  </p:stCondLst>
+                                  <p:childTnLst>
+                                    <p:set>
+                                      <p:cBhvr>
+                                        <p:cTn id="10" dur="1" fill="hold">
+                                          <p:stCondLst>
+                                            <p:cond delay="0"/>
+                                          </p:stCondLst>
+                                        </p:cTn>
+                                        <p:tgtEl>
+                                          <p:spTgt spid="22"/>
+                                        </p:tgtEl>
+                                        <p:attrNameLst>
+                                          <p:attrName>style.visibility</p:attrName>
+                                        </p:attrNameLst>
+                                      </p:cBhvr>
+                                      <p:to>
+                                        <p:strVal val="visible"/>
+                                      </p:to>
+                                    </p:set>
+                                  </p:childTnLst>
+                                </p:cTn>
+                              </p:par>
+                            </p:childTnLst>
+                          </p:cTn>
+                        </p:par>
+                      </p:childTnLst>
+                    </p:cTn>
+                  </p:par>
+                  <p:par>
+                    <p:cTn id="11" fill="hold">
+                      <p:stCondLst>
+                        <p:cond delay="indefinite"/>
+                      </p:stCondLst>
+                      <p:childTnLst>
+                        <p:par>
+                          <p:cTn id="12" fill="hold">
+                            <p:stCondLst>
+                              <p:cond delay="0"/>
+                            </p:stCondLst>
+                            <p:childTnLst>
+                              <p:par>
+                                <p:cTn id="13" presetID="1" presetClass="entr" presetSubtype="0" fill="hold" nodeType="clickEffect">
+                                  <p:stCondLst>
+                                    <p:cond delay="0"/>
+                                  </p:stCondLst>
+                                  <p:childTnLst>
+                                    <p:set>
+                                      <p:cBhvr>
+                                        <p:cTn id="14" dur="1" fill="hold">
+                                          <p:stCondLst>
+                                            <p:cond delay="0"/>
+                                          </p:stCondLst>
+                                        </p:cTn>
+                                        <p:tgtEl>
+                                          <p:spTgt spid="29"/>
+                                        </p:tgtEl>
+                                        <p:attrNameLst>
+                                          <p:attrName>style.visibility</p:attrName>
+                                        </p:attrNameLst>
+                                      </p:cBhvr>
+                                      <p:to>
+                                        <p:strVal val="visible"/>
+                                      </p:to>
+                                    </p:set>
+                                  </p:childTnLst>
+                                </p:cTn>
+                              </p:par>
+                            </p:childTnLst>
+                          </p:cTn>
+                        </p:par>
+                      </p:childTnLst>
+                    </p:cTn>
+                  </p:par>
+                  <p:par>
+                    <p:cTn id="15" fill="hold">
+                      <p:stCondLst>
+                        <p:cond delay="indefinite"/>
+                      </p:stCondLst>
+                      <p:childTnLst>
+                        <p:par>
+                          <p:cTn id="16" fill="hold">
+                            <p:stCondLst>
+                              <p:cond delay="0"/>
+                            </p:stCondLst>
+                            <p:childTnLst>
+                              <p:par>
+                                <p:cTn id="17" presetID="1" presetClass="entr" presetSubtype="0" fill="hold" nodeType="clickEffect">
+                                  <p:stCondLst>
+                                    <p:cond delay="0"/>
+                                  </p:stCondLst>
+                                  <p:childTnLst>
+                                    <p:set>
+                                      <p:cBhvr>
+                                        <p:cTn id="18" dur="1" fill="hold">
+                                          <p:stCondLst>
+                                            <p:cond delay="0"/>
+                                          </p:stCondLst>
+                                        </p:cTn>
+                                        <p:tgtEl>
+                                          <p:spTgt spid="13"/>
+                                        </p:tgtEl>
+                                        <p:attrNameLst>
+                                          <p:attrName>style.visibility</p:attrName>
+                                        </p:attrNameLst>
+                                      </p:cBhvr>
+                                      <p:to>
+                                        <p:strVal val="visible"/>
+                                      </p:to>
+                                    </p:set>
+                                  </p:childTnLst>
+                                </p:cTn>
+                              </p:par>
+                            </p:childTnLst>
+                          </p:cTn>
+                        </p:par>
+                      </p:childTnLst>
+                    </p:cTn>
+                  </p:par>
+                  <p:par>
+                    <p:cTn id="19" fill="hold">
+                      <p:stCondLst>
+                        <p:cond delay="indefinite"/>
+                      </p:stCondLst>
+                      <p:childTnLst>
+                        <p:par>
+                          <p:cTn id="20" fill="hold">
+                            <p:stCondLst>
+                              <p:cond delay="0"/>
+                            </p:stCondLst>
+                            <p:childTnLst>
+                              <p:par>
+                                <p:cTn id="21" presetID="1" presetClass="entr" presetSubtype="0" fill="hold" nodeType="clickEffect">
+                                  <p:stCondLst>
+                                    <p:cond delay="0"/>
+                                  </p:stCondLst>
+                                  <p:childTnLst>
+                                    <p:set>
+                                      <p:cBhvr>
+                                        <p:cTn id="22" dur="1" fill="hold">
+                                          <p:stCondLst>
+                                            <p:cond delay="0"/>
+                                          </p:stCondLst>
+                                        </p:cTn>
+                                        <p:tgtEl>
+                                          <p:spTgt spid="14"/>
+                                        </p:tgtEl>
+                                        <p:attrNameLst>
+                                          <p:attrName>style.visibility</p:attrName>
+                                        </p:attrNameLst>
+                                      </p:cBhvr>
+                                      <p:to>
+                                        <p:strVal val="visible"/>
+                                      </p:to>
+                                    </p:set>
+                                  </p:childTnLst>
+                                </p:cTn>
+                              </p:par>
+                            </p:childTnLst>
+                          </p:cTn>
+                        </p:par>
+                      </p:childTnLst>
+                    </p:cTn>
+                  </p:par>
+                </p:childTnLst>
+              </p:cTn>
+              <p:prevCondLst>
+                <p:cond evt="onPrev" delay="0">
+                  <p:tgtEl>
+                    <p:sldTgt/>
+                  </p:tgtEl>
+                </p:cond>
+              </p:prevCondLst>
+              <p:nextCondLst>
+                <p:cond evt="onNext" delay="0">
+                  <p:tgtEl>
+                    <p:sldTgt/>
+                  </p:tgtEl>
+                </p:cond>
+              </p:nextCondLst>
+            </p:seq>
+          </p:childTnLst>
+        </p:cTn>
+      </p:par>
+    </p:tnLst>
+  </p:timing>
 </p:sld>
 </file>
 

</xml_diff>